<commit_message>
Update apresentacao individual - Nuno
</commit_message>
<xml_diff>
--- a/Documentos/4. Apresentação Individual/Nuno/Apresentação.pptx
+++ b/Documentos/4. Apresentação Individual/Nuno/Apresentação.pptx
@@ -2,21 +2,24 @@
 <file path=ppt/presentation.xml><?xml version="1.0" encoding="utf-8"?>
 <p:presentation xmlns:a="http://schemas.openxmlformats.org/drawingml/2006/main" xmlns:r="http://schemas.openxmlformats.org/officeDocument/2006/relationships" xmlns:p="http://schemas.openxmlformats.org/presentationml/2006/main" saveSubsetFonts="1">
   <p:sldMasterIdLst>
-    <p:sldMasterId id="2147483648" r:id="rId1"/>
+    <p:sldMasterId id="2147483696" r:id="rId1"/>
   </p:sldMasterIdLst>
   <p:sldIdLst>
     <p:sldId id="256" r:id="rId2"/>
     <p:sldId id="260" r:id="rId3"/>
     <p:sldId id="258" r:id="rId4"/>
     <p:sldId id="259" r:id="rId5"/>
+    <p:sldId id="261" r:id="rId6"/>
+    <p:sldId id="262" r:id="rId7"/>
+    <p:sldId id="263" r:id="rId8"/>
   </p:sldIdLst>
   <p:sldSz cx="12192000" cy="6858000"/>
   <p:notesSz cx="6858000" cy="9144000"/>
   <p:defaultTextStyle>
     <a:defPPr>
-      <a:defRPr lang="pt-PT"/>
+      <a:defRPr lang="en-US"/>
     </a:defPPr>
-    <a:lvl1pPr marL="0" algn="l" defTabSz="914400" rtl="0" eaLnBrk="1" latinLnBrk="0" hangingPunct="1">
+    <a:lvl1pPr marL="0" algn="l" defTabSz="457200" rtl="0" eaLnBrk="1" latinLnBrk="0" hangingPunct="1">
       <a:defRPr sz="1800" kern="1200">
         <a:solidFill>
           <a:schemeClr val="tx1"/>
@@ -26,7 +29,7 @@
         <a:cs typeface="+mn-cs"/>
       </a:defRPr>
     </a:lvl1pPr>
-    <a:lvl2pPr marL="457200" algn="l" defTabSz="914400" rtl="0" eaLnBrk="1" latinLnBrk="0" hangingPunct="1">
+    <a:lvl2pPr marL="457200" algn="l" defTabSz="457200" rtl="0" eaLnBrk="1" latinLnBrk="0" hangingPunct="1">
       <a:defRPr sz="1800" kern="1200">
         <a:solidFill>
           <a:schemeClr val="tx1"/>
@@ -36,7 +39,7 @@
         <a:cs typeface="+mn-cs"/>
       </a:defRPr>
     </a:lvl2pPr>
-    <a:lvl3pPr marL="914400" algn="l" defTabSz="914400" rtl="0" eaLnBrk="1" latinLnBrk="0" hangingPunct="1">
+    <a:lvl3pPr marL="914400" algn="l" defTabSz="457200" rtl="0" eaLnBrk="1" latinLnBrk="0" hangingPunct="1">
       <a:defRPr sz="1800" kern="1200">
         <a:solidFill>
           <a:schemeClr val="tx1"/>
@@ -46,7 +49,7 @@
         <a:cs typeface="+mn-cs"/>
       </a:defRPr>
     </a:lvl3pPr>
-    <a:lvl4pPr marL="1371600" algn="l" defTabSz="914400" rtl="0" eaLnBrk="1" latinLnBrk="0" hangingPunct="1">
+    <a:lvl4pPr marL="1371600" algn="l" defTabSz="457200" rtl="0" eaLnBrk="1" latinLnBrk="0" hangingPunct="1">
       <a:defRPr sz="1800" kern="1200">
         <a:solidFill>
           <a:schemeClr val="tx1"/>
@@ -56,7 +59,7 @@
         <a:cs typeface="+mn-cs"/>
       </a:defRPr>
     </a:lvl4pPr>
-    <a:lvl5pPr marL="1828800" algn="l" defTabSz="914400" rtl="0" eaLnBrk="1" latinLnBrk="0" hangingPunct="1">
+    <a:lvl5pPr marL="1828800" algn="l" defTabSz="457200" rtl="0" eaLnBrk="1" latinLnBrk="0" hangingPunct="1">
       <a:defRPr sz="1800" kern="1200">
         <a:solidFill>
           <a:schemeClr val="tx1"/>
@@ -66,7 +69,7 @@
         <a:cs typeface="+mn-cs"/>
       </a:defRPr>
     </a:lvl5pPr>
-    <a:lvl6pPr marL="2286000" algn="l" defTabSz="914400" rtl="0" eaLnBrk="1" latinLnBrk="0" hangingPunct="1">
+    <a:lvl6pPr marL="2286000" algn="l" defTabSz="457200" rtl="0" eaLnBrk="1" latinLnBrk="0" hangingPunct="1">
       <a:defRPr sz="1800" kern="1200">
         <a:solidFill>
           <a:schemeClr val="tx1"/>
@@ -76,7 +79,7 @@
         <a:cs typeface="+mn-cs"/>
       </a:defRPr>
     </a:lvl6pPr>
-    <a:lvl7pPr marL="2743200" algn="l" defTabSz="914400" rtl="0" eaLnBrk="1" latinLnBrk="0" hangingPunct="1">
+    <a:lvl7pPr marL="2743200" algn="l" defTabSz="457200" rtl="0" eaLnBrk="1" latinLnBrk="0" hangingPunct="1">
       <a:defRPr sz="1800" kern="1200">
         <a:solidFill>
           <a:schemeClr val="tx1"/>
@@ -86,7 +89,7 @@
         <a:cs typeface="+mn-cs"/>
       </a:defRPr>
     </a:lvl7pPr>
-    <a:lvl8pPr marL="3200400" algn="l" defTabSz="914400" rtl="0" eaLnBrk="1" latinLnBrk="0" hangingPunct="1">
+    <a:lvl8pPr marL="3200400" algn="l" defTabSz="457200" rtl="0" eaLnBrk="1" latinLnBrk="0" hangingPunct="1">
       <a:defRPr sz="1800" kern="1200">
         <a:solidFill>
           <a:schemeClr val="tx1"/>
@@ -96,7 +99,7 @@
         <a:cs typeface="+mn-cs"/>
       </a:defRPr>
     </a:lvl8pPr>
-    <a:lvl9pPr marL="3657600" algn="l" defTabSz="914400" rtl="0" eaLnBrk="1" latinLnBrk="0" hangingPunct="1">
+    <a:lvl9pPr marL="3657600" algn="l" defTabSz="457200" rtl="0" eaLnBrk="1" latinLnBrk="0" hangingPunct="1">
       <a:defRPr sz="1800" kern="1200">
         <a:solidFill>
           <a:schemeClr val="tx1"/>
@@ -134,13 +137,7 @@
       </p:grpSpPr>
       <p:sp>
         <p:nvSpPr>
-          <p:cNvPr id="2" name="Título 1">
-            <a:extLst>
-              <a:ext uri="{FF2B5EF4-FFF2-40B4-BE49-F238E27FC236}">
-                <a16:creationId xmlns:a16="http://schemas.microsoft.com/office/drawing/2014/main" id="{0C536A85-029A-4124-B39A-5DCDE87B7518}"/>
-              </a:ext>
-            </a:extLst>
-          </p:cNvPr>
+          <p:cNvPr id="2" name="Title 1"/>
           <p:cNvSpPr>
             <a:spLocks noGrp="1"/>
           </p:cNvSpPr>
@@ -150,15 +147,17 @@
         </p:nvSpPr>
         <p:spPr>
           <a:xfrm>
-            <a:off x="1524000" y="1122363"/>
-            <a:ext cx="9144000" cy="2387600"/>
+            <a:off x="1774423" y="802298"/>
+            <a:ext cx="8637073" cy="2920713"/>
           </a:xfrm>
         </p:spPr>
         <p:txBody>
-          <a:bodyPr anchor="b"/>
+          <a:bodyPr bIns="0" anchor="b">
+            <a:normAutofit/>
+          </a:bodyPr>
           <a:lstStyle>
             <a:lvl1pPr algn="ctr">
-              <a:defRPr sz="6000"/>
+              <a:defRPr sz="6600"/>
             </a:lvl1pPr>
           </a:lstStyle>
           <a:p>
@@ -166,18 +165,13 @@
               <a:rPr lang="pt-PT"/>
               <a:t>Clique para editar o estilo de título do Modelo Global</a:t>
             </a:r>
-          </a:p>
-        </p:txBody>
-      </p:sp>
-      <p:sp>
-        <p:nvSpPr>
-          <p:cNvPr id="3" name="Subtítulo 2">
-            <a:extLst>
-              <a:ext uri="{FF2B5EF4-FFF2-40B4-BE49-F238E27FC236}">
-                <a16:creationId xmlns:a16="http://schemas.microsoft.com/office/drawing/2014/main" id="{F37A1883-8265-458E-BA1E-7A4053F2667C}"/>
-              </a:ext>
-            </a:extLst>
-          </p:cNvPr>
+            <a:endParaRPr lang="en-US" dirty="0"/>
+          </a:p>
+        </p:txBody>
+      </p:sp>
+      <p:sp>
+        <p:nvSpPr>
+          <p:cNvPr id="3" name="Subtitle 2"/>
           <p:cNvSpPr>
             <a:spLocks noGrp="1"/>
           </p:cNvSpPr>
@@ -187,20 +181,26 @@
         </p:nvSpPr>
         <p:spPr>
           <a:xfrm>
-            <a:off x="1524000" y="3602038"/>
-            <a:ext cx="9144000" cy="1655762"/>
+            <a:off x="1774424" y="3724074"/>
+            <a:ext cx="8637072" cy="977621"/>
           </a:xfrm>
         </p:spPr>
         <p:txBody>
-          <a:bodyPr/>
+          <a:bodyPr tIns="91440" bIns="91440">
+            <a:normAutofit/>
+          </a:bodyPr>
           <a:lstStyle>
             <a:lvl1pPr marL="0" indent="0" algn="ctr">
               <a:buNone/>
-              <a:defRPr sz="2400"/>
+              <a:defRPr sz="1800" b="0" cap="all" baseline="0">
+                <a:solidFill>
+                  <a:schemeClr val="tx1"/>
+                </a:solidFill>
+              </a:defRPr>
             </a:lvl1pPr>
             <a:lvl2pPr marL="457200" indent="0" algn="ctr">
               <a:buNone/>
-              <a:defRPr sz="2000"/>
+              <a:defRPr sz="1800"/>
             </a:lvl2pPr>
             <a:lvl3pPr marL="914400" indent="0" algn="ctr">
               <a:buNone/>
@@ -236,18 +236,13 @@
               <a:rPr lang="pt-PT"/>
               <a:t>Clique para editar o estilo de subtítulo do Modelo Global</a:t>
             </a:r>
-          </a:p>
-        </p:txBody>
-      </p:sp>
-      <p:sp>
-        <p:nvSpPr>
-          <p:cNvPr id="4" name="Marcador de Posição da Data 3">
-            <a:extLst>
-              <a:ext uri="{FF2B5EF4-FFF2-40B4-BE49-F238E27FC236}">
-                <a16:creationId xmlns:a16="http://schemas.microsoft.com/office/drawing/2014/main" id="{F88105D6-7EB5-4B5B-AAEA-B7A56C77B588}"/>
-              </a:ext>
-            </a:extLst>
-          </p:cNvPr>
+            <a:endParaRPr lang="en-US" dirty="0"/>
+          </a:p>
+        </p:txBody>
+      </p:sp>
+      <p:sp>
+        <p:nvSpPr>
+          <p:cNvPr id="4" name="Date Placeholder 3"/>
           <p:cNvSpPr>
             <a:spLocks noGrp="1"/>
           </p:cNvSpPr>
@@ -262,7 +257,7 @@
           <a:p>
             <a:fld id="{C2437300-0444-4CE7-907B-B7E5D4BCB335}" type="datetimeFigureOut">
               <a:rPr lang="pt-PT" smtClean="0"/>
-              <a:t>22/04/2018</a:t>
+              <a:t>25/04/2018</a:t>
             </a:fld>
             <a:endParaRPr lang="pt-PT"/>
           </a:p>
@@ -270,13 +265,7 @@
       </p:sp>
       <p:sp>
         <p:nvSpPr>
-          <p:cNvPr id="5" name="Marcador de Posição do Rodapé 4">
-            <a:extLst>
-              <a:ext uri="{FF2B5EF4-FFF2-40B4-BE49-F238E27FC236}">
-                <a16:creationId xmlns:a16="http://schemas.microsoft.com/office/drawing/2014/main" id="{B2E1B0CB-2AB1-4461-A4D3-471736A47E46}"/>
-              </a:ext>
-            </a:extLst>
-          </p:cNvPr>
+          <p:cNvPr id="5" name="Footer Placeholder 4"/>
           <p:cNvSpPr>
             <a:spLocks noGrp="1"/>
           </p:cNvSpPr>
@@ -284,7 +273,12 @@
             <p:ph type="ftr" sz="quarter" idx="11"/>
           </p:nvPr>
         </p:nvSpPr>
-        <p:spPr/>
+        <p:spPr>
+          <a:xfrm>
+            <a:off x="1451579" y="329307"/>
+            <a:ext cx="5626774" cy="309201"/>
+          </a:xfrm>
+        </p:spPr>
         <p:txBody>
           <a:bodyPr/>
           <a:lstStyle/>
@@ -295,13 +289,7 @@
       </p:sp>
       <p:sp>
         <p:nvSpPr>
-          <p:cNvPr id="6" name="Marcador de Posição do Número do Diapositivo 5">
-            <a:extLst>
-              <a:ext uri="{FF2B5EF4-FFF2-40B4-BE49-F238E27FC236}">
-                <a16:creationId xmlns:a16="http://schemas.microsoft.com/office/drawing/2014/main" id="{B11B45FA-6572-4D19-8B93-65699FD740E1}"/>
-              </a:ext>
-            </a:extLst>
-          </p:cNvPr>
+          <p:cNvPr id="6" name="Slide Number Placeholder 5"/>
           <p:cNvSpPr>
             <a:spLocks noGrp="1"/>
           </p:cNvSpPr>
@@ -309,7 +297,12 @@
             <p:ph type="sldNum" sz="quarter" idx="12"/>
           </p:nvPr>
         </p:nvSpPr>
-        <p:spPr/>
+        <p:spPr>
+          <a:xfrm>
+            <a:off x="476834" y="798973"/>
+            <a:ext cx="811019" cy="503578"/>
+          </a:xfrm>
+        </p:spPr>
         <p:txBody>
           <a:bodyPr/>
           <a:lstStyle/>
@@ -325,7 +318,7 @@
     </p:spTree>
     <p:extLst>
       <p:ext uri="{BB962C8B-B14F-4D97-AF65-F5344CB8AC3E}">
-        <p14:creationId xmlns:p14="http://schemas.microsoft.com/office/powerpoint/2010/main" val="2193058378"/>
+        <p14:creationId xmlns:p14="http://schemas.microsoft.com/office/powerpoint/2010/main" val="67000679"/>
       </p:ext>
     </p:extLst>
   </p:cSld>
@@ -354,13 +347,7 @@
       </p:grpSpPr>
       <p:sp>
         <p:nvSpPr>
-          <p:cNvPr id="2" name="Título 1">
-            <a:extLst>
-              <a:ext uri="{FF2B5EF4-FFF2-40B4-BE49-F238E27FC236}">
-                <a16:creationId xmlns:a16="http://schemas.microsoft.com/office/drawing/2014/main" id="{83A09187-625A-400D-ACF2-96D900FAE296}"/>
-              </a:ext>
-            </a:extLst>
-          </p:cNvPr>
+          <p:cNvPr id="2" name="Title 1"/>
           <p:cNvSpPr>
             <a:spLocks noGrp="1"/>
           </p:cNvSpPr>
@@ -377,18 +364,13 @@
               <a:rPr lang="pt-PT"/>
               <a:t>Clique para editar o estilo de título do Modelo Global</a:t>
             </a:r>
-          </a:p>
-        </p:txBody>
-      </p:sp>
-      <p:sp>
-        <p:nvSpPr>
-          <p:cNvPr id="3" name="Marcador de Posição de Texto Vertical 2">
-            <a:extLst>
-              <a:ext uri="{FF2B5EF4-FFF2-40B4-BE49-F238E27FC236}">
-                <a16:creationId xmlns:a16="http://schemas.microsoft.com/office/drawing/2014/main" id="{30892673-438D-4A9C-9541-B39E0F9860F1}"/>
-              </a:ext>
-            </a:extLst>
-          </p:cNvPr>
+            <a:endParaRPr lang="en-US" dirty="0"/>
+          </a:p>
+        </p:txBody>
+      </p:sp>
+      <p:sp>
+        <p:nvSpPr>
+          <p:cNvPr id="3" name="Vertical Text Placeholder 2"/>
           <p:cNvSpPr>
             <a:spLocks noGrp="1"/>
           </p:cNvSpPr>
@@ -434,18 +416,13 @@
               <a:rPr lang="pt-PT"/>
               <a:t>Quinto nível</a:t>
             </a:r>
-          </a:p>
-        </p:txBody>
-      </p:sp>
-      <p:sp>
-        <p:nvSpPr>
-          <p:cNvPr id="4" name="Marcador de Posição da Data 3">
-            <a:extLst>
-              <a:ext uri="{FF2B5EF4-FFF2-40B4-BE49-F238E27FC236}">
-                <a16:creationId xmlns:a16="http://schemas.microsoft.com/office/drawing/2014/main" id="{5C23D3D1-257F-468B-8338-FA1D512DE678}"/>
-              </a:ext>
-            </a:extLst>
-          </p:cNvPr>
+            <a:endParaRPr lang="en-US" dirty="0"/>
+          </a:p>
+        </p:txBody>
+      </p:sp>
+      <p:sp>
+        <p:nvSpPr>
+          <p:cNvPr id="4" name="Date Placeholder 3"/>
           <p:cNvSpPr>
             <a:spLocks noGrp="1"/>
           </p:cNvSpPr>
@@ -460,7 +437,7 @@
           <a:p>
             <a:fld id="{C2437300-0444-4CE7-907B-B7E5D4BCB335}" type="datetimeFigureOut">
               <a:rPr lang="pt-PT" smtClean="0"/>
-              <a:t>22/04/2018</a:t>
+              <a:t>25/04/2018</a:t>
             </a:fld>
             <a:endParaRPr lang="pt-PT"/>
           </a:p>
@@ -468,13 +445,7 @@
       </p:sp>
       <p:sp>
         <p:nvSpPr>
-          <p:cNvPr id="5" name="Marcador de Posição do Rodapé 4">
-            <a:extLst>
-              <a:ext uri="{FF2B5EF4-FFF2-40B4-BE49-F238E27FC236}">
-                <a16:creationId xmlns:a16="http://schemas.microsoft.com/office/drawing/2014/main" id="{F3ECDED3-1836-49E7-AC4A-EB827DF001C1}"/>
-              </a:ext>
-            </a:extLst>
-          </p:cNvPr>
+          <p:cNvPr id="5" name="Footer Placeholder 4"/>
           <p:cNvSpPr>
             <a:spLocks noGrp="1"/>
           </p:cNvSpPr>
@@ -493,13 +464,7 @@
       </p:sp>
       <p:sp>
         <p:nvSpPr>
-          <p:cNvPr id="6" name="Marcador de Posição do Número do Diapositivo 5">
-            <a:extLst>
-              <a:ext uri="{FF2B5EF4-FFF2-40B4-BE49-F238E27FC236}">
-                <a16:creationId xmlns:a16="http://schemas.microsoft.com/office/drawing/2014/main" id="{60DDD97E-DDD9-4A7B-810D-1D09B8EECD49}"/>
-              </a:ext>
-            </a:extLst>
-          </p:cNvPr>
+          <p:cNvPr id="6" name="Slide Number Placeholder 5"/>
           <p:cNvSpPr>
             <a:spLocks noGrp="1"/>
           </p:cNvSpPr>
@@ -523,7 +488,7 @@
     </p:spTree>
     <p:extLst>
       <p:ext uri="{BB962C8B-B14F-4D97-AF65-F5344CB8AC3E}">
-        <p14:creationId xmlns:p14="http://schemas.microsoft.com/office/powerpoint/2010/main" val="1839737080"/>
+        <p14:creationId xmlns:p14="http://schemas.microsoft.com/office/powerpoint/2010/main" val="2798770632"/>
       </p:ext>
     </p:extLst>
   </p:cSld>
@@ -552,13 +517,7 @@
       </p:grpSpPr>
       <p:sp>
         <p:nvSpPr>
-          <p:cNvPr id="2" name="Título Vertical 1">
-            <a:extLst>
-              <a:ext uri="{FF2B5EF4-FFF2-40B4-BE49-F238E27FC236}">
-                <a16:creationId xmlns:a16="http://schemas.microsoft.com/office/drawing/2014/main" id="{88C79CEA-7F5F-4117-BD11-C09D8E7BE937}"/>
-              </a:ext>
-            </a:extLst>
-          </p:cNvPr>
+          <p:cNvPr id="2" name="Vertical Title 1"/>
           <p:cNvSpPr>
             <a:spLocks noGrp="1"/>
           </p:cNvSpPr>
@@ -568,30 +527,29 @@
         </p:nvSpPr>
         <p:spPr>
           <a:xfrm>
-            <a:off x="8724900" y="365125"/>
-            <a:ext cx="2628900" cy="5811838"/>
+            <a:off x="9127052" y="798973"/>
+            <a:ext cx="1615742" cy="4659889"/>
           </a:xfrm>
         </p:spPr>
         <p:txBody>
           <a:bodyPr vert="eaVert"/>
-          <a:lstStyle/>
+          <a:lstStyle>
+            <a:lvl1pPr algn="l">
+              <a:defRPr/>
+            </a:lvl1pPr>
+          </a:lstStyle>
           <a:p>
             <a:r>
               <a:rPr lang="pt-PT"/>
               <a:t>Clique para editar o estilo de título do Modelo Global</a:t>
             </a:r>
-          </a:p>
-        </p:txBody>
-      </p:sp>
-      <p:sp>
-        <p:nvSpPr>
-          <p:cNvPr id="3" name="Marcador de Posição de Texto Vertical 2">
-            <a:extLst>
-              <a:ext uri="{FF2B5EF4-FFF2-40B4-BE49-F238E27FC236}">
-                <a16:creationId xmlns:a16="http://schemas.microsoft.com/office/drawing/2014/main" id="{635E47BF-0B63-4346-B9E6-6E37A3A29398}"/>
-              </a:ext>
-            </a:extLst>
-          </p:cNvPr>
+            <a:endParaRPr lang="en-US" dirty="0"/>
+          </a:p>
+        </p:txBody>
+      </p:sp>
+      <p:sp>
+        <p:nvSpPr>
+          <p:cNvPr id="3" name="Vertical Text Placeholder 2"/>
           <p:cNvSpPr>
             <a:spLocks noGrp="1"/>
           </p:cNvSpPr>
@@ -601,8 +559,8 @@
         </p:nvSpPr>
         <p:spPr>
           <a:xfrm>
-            <a:off x="838200" y="365125"/>
-            <a:ext cx="7734300" cy="5811838"/>
+            <a:off x="1444672" y="798973"/>
+            <a:ext cx="7518654" cy="4659889"/>
           </a:xfrm>
         </p:spPr>
         <p:txBody>
@@ -642,18 +600,13 @@
               <a:rPr lang="pt-PT"/>
               <a:t>Quinto nível</a:t>
             </a:r>
-          </a:p>
-        </p:txBody>
-      </p:sp>
-      <p:sp>
-        <p:nvSpPr>
-          <p:cNvPr id="4" name="Marcador de Posição da Data 3">
-            <a:extLst>
-              <a:ext uri="{FF2B5EF4-FFF2-40B4-BE49-F238E27FC236}">
-                <a16:creationId xmlns:a16="http://schemas.microsoft.com/office/drawing/2014/main" id="{3E2C8D74-CEDC-4C8A-BA64-BF50A982A76D}"/>
-              </a:ext>
-            </a:extLst>
-          </p:cNvPr>
+            <a:endParaRPr lang="en-US" dirty="0"/>
+          </a:p>
+        </p:txBody>
+      </p:sp>
+      <p:sp>
+        <p:nvSpPr>
+          <p:cNvPr id="4" name="Date Placeholder 3"/>
           <p:cNvSpPr>
             <a:spLocks noGrp="1"/>
           </p:cNvSpPr>
@@ -668,7 +621,7 @@
           <a:p>
             <a:fld id="{C2437300-0444-4CE7-907B-B7E5D4BCB335}" type="datetimeFigureOut">
               <a:rPr lang="pt-PT" smtClean="0"/>
-              <a:t>22/04/2018</a:t>
+              <a:t>25/04/2018</a:t>
             </a:fld>
             <a:endParaRPr lang="pt-PT"/>
           </a:p>
@@ -676,13 +629,7 @@
       </p:sp>
       <p:sp>
         <p:nvSpPr>
-          <p:cNvPr id="5" name="Marcador de Posição do Rodapé 4">
-            <a:extLst>
-              <a:ext uri="{FF2B5EF4-FFF2-40B4-BE49-F238E27FC236}">
-                <a16:creationId xmlns:a16="http://schemas.microsoft.com/office/drawing/2014/main" id="{E323EB2E-9C3F-4C71-B301-BE285182FAB8}"/>
-              </a:ext>
-            </a:extLst>
-          </p:cNvPr>
+          <p:cNvPr id="5" name="Footer Placeholder 4"/>
           <p:cNvSpPr>
             <a:spLocks noGrp="1"/>
           </p:cNvSpPr>
@@ -701,13 +648,7 @@
       </p:sp>
       <p:sp>
         <p:nvSpPr>
-          <p:cNvPr id="6" name="Marcador de Posição do Número do Diapositivo 5">
-            <a:extLst>
-              <a:ext uri="{FF2B5EF4-FFF2-40B4-BE49-F238E27FC236}">
-                <a16:creationId xmlns:a16="http://schemas.microsoft.com/office/drawing/2014/main" id="{B9ACEBCC-6946-4CB9-A06C-FF1A32371CCA}"/>
-              </a:ext>
-            </a:extLst>
-          </p:cNvPr>
+          <p:cNvPr id="6" name="Slide Number Placeholder 5"/>
           <p:cNvSpPr>
             <a:spLocks noGrp="1"/>
           </p:cNvSpPr>
@@ -731,7 +672,7 @@
     </p:spTree>
     <p:extLst>
       <p:ext uri="{BB962C8B-B14F-4D97-AF65-F5344CB8AC3E}">
-        <p14:creationId xmlns:p14="http://schemas.microsoft.com/office/powerpoint/2010/main" val="781225223"/>
+        <p14:creationId xmlns:p14="http://schemas.microsoft.com/office/powerpoint/2010/main" val="1537012646"/>
       </p:ext>
     </p:extLst>
   </p:cSld>
@@ -760,13 +701,7 @@
       </p:grpSpPr>
       <p:sp>
         <p:nvSpPr>
-          <p:cNvPr id="2" name="Título 1">
-            <a:extLst>
-              <a:ext uri="{FF2B5EF4-FFF2-40B4-BE49-F238E27FC236}">
-                <a16:creationId xmlns:a16="http://schemas.microsoft.com/office/drawing/2014/main" id="{7823540D-B9F4-4EDF-B527-9741140B9463}"/>
-              </a:ext>
-            </a:extLst>
-          </p:cNvPr>
+          <p:cNvPr id="2" name="Title 1"/>
           <p:cNvSpPr>
             <a:spLocks noGrp="1"/>
           </p:cNvSpPr>
@@ -783,18 +718,13 @@
               <a:rPr lang="pt-PT"/>
               <a:t>Clique para editar o estilo de título do Modelo Global</a:t>
             </a:r>
-          </a:p>
-        </p:txBody>
-      </p:sp>
-      <p:sp>
-        <p:nvSpPr>
-          <p:cNvPr id="3" name="Marcador de Posição de Conteúdo 2">
-            <a:extLst>
-              <a:ext uri="{FF2B5EF4-FFF2-40B4-BE49-F238E27FC236}">
-                <a16:creationId xmlns:a16="http://schemas.microsoft.com/office/drawing/2014/main" id="{19749A85-DD39-4762-8D19-9A0B8F66FB68}"/>
-              </a:ext>
-            </a:extLst>
-          </p:cNvPr>
+            <a:endParaRPr lang="en-US" dirty="0"/>
+          </a:p>
+        </p:txBody>
+      </p:sp>
+      <p:sp>
+        <p:nvSpPr>
+          <p:cNvPr id="3" name="Content Placeholder 2"/>
           <p:cNvSpPr>
             <a:spLocks noGrp="1"/>
           </p:cNvSpPr>
@@ -804,7 +734,7 @@
         </p:nvSpPr>
         <p:spPr/>
         <p:txBody>
-          <a:bodyPr/>
+          <a:bodyPr anchor="t"/>
           <a:lstStyle/>
           <a:p>
             <a:pPr lvl="0"/>
@@ -840,18 +770,13 @@
               <a:rPr lang="pt-PT"/>
               <a:t>Quinto nível</a:t>
             </a:r>
-          </a:p>
-        </p:txBody>
-      </p:sp>
-      <p:sp>
-        <p:nvSpPr>
-          <p:cNvPr id="4" name="Marcador de Posição da Data 3">
-            <a:extLst>
-              <a:ext uri="{FF2B5EF4-FFF2-40B4-BE49-F238E27FC236}">
-                <a16:creationId xmlns:a16="http://schemas.microsoft.com/office/drawing/2014/main" id="{05235BA2-80A5-4A4E-8D94-2EA21E6FEE9B}"/>
-              </a:ext>
-            </a:extLst>
-          </p:cNvPr>
+            <a:endParaRPr lang="en-US" dirty="0"/>
+          </a:p>
+        </p:txBody>
+      </p:sp>
+      <p:sp>
+        <p:nvSpPr>
+          <p:cNvPr id="4" name="Date Placeholder 3"/>
           <p:cNvSpPr>
             <a:spLocks noGrp="1"/>
           </p:cNvSpPr>
@@ -866,7 +791,7 @@
           <a:p>
             <a:fld id="{C2437300-0444-4CE7-907B-B7E5D4BCB335}" type="datetimeFigureOut">
               <a:rPr lang="pt-PT" smtClean="0"/>
-              <a:t>22/04/2018</a:t>
+              <a:t>25/04/2018</a:t>
             </a:fld>
             <a:endParaRPr lang="pt-PT"/>
           </a:p>
@@ -874,13 +799,7 @@
       </p:sp>
       <p:sp>
         <p:nvSpPr>
-          <p:cNvPr id="5" name="Marcador de Posição do Rodapé 4">
-            <a:extLst>
-              <a:ext uri="{FF2B5EF4-FFF2-40B4-BE49-F238E27FC236}">
-                <a16:creationId xmlns:a16="http://schemas.microsoft.com/office/drawing/2014/main" id="{B61BA8C7-1582-4203-BEF9-0D92255196FF}"/>
-              </a:ext>
-            </a:extLst>
-          </p:cNvPr>
+          <p:cNvPr id="5" name="Footer Placeholder 4"/>
           <p:cNvSpPr>
             <a:spLocks noGrp="1"/>
           </p:cNvSpPr>
@@ -899,13 +818,7 @@
       </p:sp>
       <p:sp>
         <p:nvSpPr>
-          <p:cNvPr id="6" name="Marcador de Posição do Número do Diapositivo 5">
-            <a:extLst>
-              <a:ext uri="{FF2B5EF4-FFF2-40B4-BE49-F238E27FC236}">
-                <a16:creationId xmlns:a16="http://schemas.microsoft.com/office/drawing/2014/main" id="{7D2AE3F0-E445-497A-BCCE-7BEDF1F25CF5}"/>
-              </a:ext>
-            </a:extLst>
-          </p:cNvPr>
+          <p:cNvPr id="6" name="Slide Number Placeholder 5"/>
           <p:cNvSpPr>
             <a:spLocks noGrp="1"/>
           </p:cNvSpPr>
@@ -929,7 +842,7 @@
     </p:spTree>
     <p:extLst>
       <p:ext uri="{BB962C8B-B14F-4D97-AF65-F5344CB8AC3E}">
-        <p14:creationId xmlns:p14="http://schemas.microsoft.com/office/powerpoint/2010/main" val="359650813"/>
+        <p14:creationId xmlns:p14="http://schemas.microsoft.com/office/powerpoint/2010/main" val="391961012"/>
       </p:ext>
     </p:extLst>
   </p:cSld>
@@ -958,13 +871,7 @@
       </p:grpSpPr>
       <p:sp>
         <p:nvSpPr>
-          <p:cNvPr id="2" name="Título 1">
-            <a:extLst>
-              <a:ext uri="{FF2B5EF4-FFF2-40B4-BE49-F238E27FC236}">
-                <a16:creationId xmlns:a16="http://schemas.microsoft.com/office/drawing/2014/main" id="{805DE09A-3AFB-4AA3-86D3-71F6656F2D2A}"/>
-              </a:ext>
-            </a:extLst>
-          </p:cNvPr>
+          <p:cNvPr id="2" name="Title 1"/>
           <p:cNvSpPr>
             <a:spLocks noGrp="1"/>
           </p:cNvSpPr>
@@ -974,15 +881,17 @@
         </p:nvSpPr>
         <p:spPr>
           <a:xfrm>
-            <a:off x="831850" y="1709738"/>
-            <a:ext cx="10515600" cy="2852737"/>
+            <a:off x="1774423" y="1756130"/>
+            <a:ext cx="8643154" cy="1969007"/>
           </a:xfrm>
         </p:spPr>
         <p:txBody>
-          <a:bodyPr anchor="b"/>
+          <a:bodyPr anchor="b">
+            <a:normAutofit/>
+          </a:bodyPr>
           <a:lstStyle>
-            <a:lvl1pPr>
-              <a:defRPr sz="6000"/>
+            <a:lvl1pPr algn="ctr">
+              <a:defRPr sz="3600"/>
             </a:lvl1pPr>
           </a:lstStyle>
           <a:p>
@@ -990,18 +899,13 @@
               <a:rPr lang="pt-PT"/>
               <a:t>Clique para editar o estilo de título do Modelo Global</a:t>
             </a:r>
-          </a:p>
-        </p:txBody>
-      </p:sp>
-      <p:sp>
-        <p:nvSpPr>
-          <p:cNvPr id="3" name="Marcador de Posição do Texto 2">
-            <a:extLst>
-              <a:ext uri="{FF2B5EF4-FFF2-40B4-BE49-F238E27FC236}">
-                <a16:creationId xmlns:a16="http://schemas.microsoft.com/office/drawing/2014/main" id="{CA45C986-E2B0-433B-A77B-7F1ACADCCF36}"/>
-              </a:ext>
-            </a:extLst>
-          </p:cNvPr>
+            <a:endParaRPr lang="en-US" dirty="0"/>
+          </a:p>
+        </p:txBody>
+      </p:sp>
+      <p:sp>
+        <p:nvSpPr>
+          <p:cNvPr id="3" name="Text Placeholder 2"/>
           <p:cNvSpPr>
             <a:spLocks noGrp="1"/>
           </p:cNvSpPr>
@@ -1011,26 +915,26 @@
         </p:nvSpPr>
         <p:spPr>
           <a:xfrm>
-            <a:off x="831850" y="4589463"/>
-            <a:ext cx="10515600" cy="1500187"/>
+            <a:off x="1774423" y="3725137"/>
+            <a:ext cx="8643154" cy="1093987"/>
           </a:xfrm>
         </p:spPr>
         <p:txBody>
-          <a:bodyPr/>
+          <a:bodyPr tIns="91440">
+            <a:normAutofit/>
+          </a:bodyPr>
           <a:lstStyle>
-            <a:lvl1pPr marL="0" indent="0">
-              <a:buNone/>
-              <a:defRPr sz="2400">
+            <a:lvl1pPr marL="0" indent="0" algn="ctr">
+              <a:buNone/>
+              <a:defRPr sz="1800">
                 <a:solidFill>
-                  <a:schemeClr val="tx1">
-                    <a:tint val="75000"/>
-                  </a:schemeClr>
+                  <a:schemeClr val="tx1"/>
                 </a:solidFill>
               </a:defRPr>
             </a:lvl1pPr>
             <a:lvl2pPr marL="457200" indent="0">
               <a:buNone/>
-              <a:defRPr sz="2000">
+              <a:defRPr sz="1800">
                 <a:solidFill>
                   <a:schemeClr val="tx1">
                     <a:tint val="75000"/>
@@ -1120,13 +1024,7 @@
       </p:sp>
       <p:sp>
         <p:nvSpPr>
-          <p:cNvPr id="4" name="Marcador de Posição da Data 3">
-            <a:extLst>
-              <a:ext uri="{FF2B5EF4-FFF2-40B4-BE49-F238E27FC236}">
-                <a16:creationId xmlns:a16="http://schemas.microsoft.com/office/drawing/2014/main" id="{092CD65E-A832-4165-8B74-FAB963040915}"/>
-              </a:ext>
-            </a:extLst>
-          </p:cNvPr>
+          <p:cNvPr id="4" name="Date Placeholder 3"/>
           <p:cNvSpPr>
             <a:spLocks noGrp="1"/>
           </p:cNvSpPr>
@@ -1141,7 +1039,7 @@
           <a:p>
             <a:fld id="{C2437300-0444-4CE7-907B-B7E5D4BCB335}" type="datetimeFigureOut">
               <a:rPr lang="pt-PT" smtClean="0"/>
-              <a:t>22/04/2018</a:t>
+              <a:t>25/04/2018</a:t>
             </a:fld>
             <a:endParaRPr lang="pt-PT"/>
           </a:p>
@@ -1149,13 +1047,7 @@
       </p:sp>
       <p:sp>
         <p:nvSpPr>
-          <p:cNvPr id="5" name="Marcador de Posição do Rodapé 4">
-            <a:extLst>
-              <a:ext uri="{FF2B5EF4-FFF2-40B4-BE49-F238E27FC236}">
-                <a16:creationId xmlns:a16="http://schemas.microsoft.com/office/drawing/2014/main" id="{C614364C-66DD-4D99-85FB-8D762631EE6F}"/>
-              </a:ext>
-            </a:extLst>
-          </p:cNvPr>
+          <p:cNvPr id="5" name="Footer Placeholder 4"/>
           <p:cNvSpPr>
             <a:spLocks noGrp="1"/>
           </p:cNvSpPr>
@@ -1174,13 +1066,7 @@
       </p:sp>
       <p:sp>
         <p:nvSpPr>
-          <p:cNvPr id="6" name="Marcador de Posição do Número do Diapositivo 5">
-            <a:extLst>
-              <a:ext uri="{FF2B5EF4-FFF2-40B4-BE49-F238E27FC236}">
-                <a16:creationId xmlns:a16="http://schemas.microsoft.com/office/drawing/2014/main" id="{E4DE3E4A-1410-4C04-B76A-B43C2E57D856}"/>
-              </a:ext>
-            </a:extLst>
-          </p:cNvPr>
+          <p:cNvPr id="6" name="Slide Number Placeholder 5"/>
           <p:cNvSpPr>
             <a:spLocks noGrp="1"/>
           </p:cNvSpPr>
@@ -1204,7 +1090,7 @@
     </p:spTree>
     <p:extLst>
       <p:ext uri="{BB962C8B-B14F-4D97-AF65-F5344CB8AC3E}">
-        <p14:creationId xmlns:p14="http://schemas.microsoft.com/office/powerpoint/2010/main" val="1732521049"/>
+        <p14:creationId xmlns:p14="http://schemas.microsoft.com/office/powerpoint/2010/main" val="1895170218"/>
       </p:ext>
     </p:extLst>
   </p:cSld>
@@ -1233,114 +1119,46 @@
       </p:grpSpPr>
       <p:sp>
         <p:nvSpPr>
-          <p:cNvPr id="2" name="Título 1">
-            <a:extLst>
-              <a:ext uri="{FF2B5EF4-FFF2-40B4-BE49-F238E27FC236}">
-                <a16:creationId xmlns:a16="http://schemas.microsoft.com/office/drawing/2014/main" id="{38F1BC9E-357C-4CB7-9CC3-5AC17EFE8FCA}"/>
-              </a:ext>
-            </a:extLst>
-          </p:cNvPr>
+          <p:cNvPr id="2" name="Title 1"/>
           <p:cNvSpPr>
             <a:spLocks noGrp="1"/>
           </p:cNvSpPr>
           <p:nvPr>
             <p:ph type="title"/>
-          </p:nvPr>
-        </p:nvSpPr>
-        <p:spPr/>
-        <p:txBody>
-          <a:bodyPr/>
-          <a:lstStyle/>
-          <a:p>
-            <a:r>
-              <a:rPr lang="pt-PT"/>
-              <a:t>Clique para editar o estilo de título do Modelo Global</a:t>
-            </a:r>
-          </a:p>
-        </p:txBody>
-      </p:sp>
-      <p:sp>
-        <p:nvSpPr>
-          <p:cNvPr id="3" name="Marcador de Posição de Conteúdo 2">
-            <a:extLst>
-              <a:ext uri="{FF2B5EF4-FFF2-40B4-BE49-F238E27FC236}">
-                <a16:creationId xmlns:a16="http://schemas.microsoft.com/office/drawing/2014/main" id="{A4B24CC3-5610-4F2E-ABEA-CEE9DB8506F8}"/>
-              </a:ext>
-            </a:extLst>
-          </p:cNvPr>
-          <p:cNvSpPr>
-            <a:spLocks noGrp="1"/>
-          </p:cNvSpPr>
-          <p:nvPr>
-            <p:ph sz="half" idx="1"/>
           </p:nvPr>
         </p:nvSpPr>
         <p:spPr>
           <a:xfrm>
-            <a:off x="838200" y="1825625"/>
-            <a:ext cx="5181600" cy="4351338"/>
+            <a:off x="1449217" y="804889"/>
+            <a:ext cx="9293577" cy="1059305"/>
           </a:xfrm>
         </p:spPr>
         <p:txBody>
           <a:bodyPr/>
           <a:lstStyle/>
           <a:p>
-            <a:pPr lvl="0"/>
-            <a:r>
-              <a:rPr lang="pt-PT"/>
-              <a:t>Editar os estilos de texto do Modelo Global</a:t>
-            </a:r>
-          </a:p>
-          <a:p>
-            <a:pPr lvl="1"/>
-            <a:r>
-              <a:rPr lang="pt-PT"/>
-              <a:t>Segundo nível</a:t>
-            </a:r>
-          </a:p>
-          <a:p>
-            <a:pPr lvl="2"/>
-            <a:r>
-              <a:rPr lang="pt-PT"/>
-              <a:t>Terceiro nível</a:t>
-            </a:r>
-          </a:p>
-          <a:p>
-            <a:pPr lvl="3"/>
-            <a:r>
-              <a:rPr lang="pt-PT"/>
-              <a:t>Quarto nível</a:t>
-            </a:r>
-          </a:p>
-          <a:p>
-            <a:pPr lvl="4"/>
-            <a:r>
-              <a:rPr lang="pt-PT"/>
-              <a:t>Quinto nível</a:t>
-            </a:r>
-          </a:p>
-        </p:txBody>
-      </p:sp>
-      <p:sp>
-        <p:nvSpPr>
-          <p:cNvPr id="4" name="Marcador de Posição de Conteúdo 3">
-            <a:extLst>
-              <a:ext uri="{FF2B5EF4-FFF2-40B4-BE49-F238E27FC236}">
-                <a16:creationId xmlns:a16="http://schemas.microsoft.com/office/drawing/2014/main" id="{5F5E114D-9775-4FC3-A317-A44100E69469}"/>
-              </a:ext>
-            </a:extLst>
-          </p:cNvPr>
-          <p:cNvSpPr>
-            <a:spLocks noGrp="1"/>
-          </p:cNvSpPr>
-          <p:nvPr>
-            <p:ph sz="half" idx="2"/>
+            <a:r>
+              <a:rPr lang="pt-PT"/>
+              <a:t>Clique para editar o estilo de título do Modelo Global</a:t>
+            </a:r>
+            <a:endParaRPr lang="en-US" dirty="0"/>
+          </a:p>
+        </p:txBody>
+      </p:sp>
+      <p:sp>
+        <p:nvSpPr>
+          <p:cNvPr id="3" name="Content Placeholder 2"/>
+          <p:cNvSpPr>
+            <a:spLocks noGrp="1"/>
+          </p:cNvSpPr>
+          <p:nvPr>
+            <p:ph sz="half" idx="1"/>
           </p:nvPr>
         </p:nvSpPr>
         <p:spPr>
           <a:xfrm>
-            <a:off x="6172200" y="1825625"/>
-            <a:ext cx="5181600" cy="4351338"/>
+            <a:off x="1447331" y="2010878"/>
+            <a:ext cx="4488654" cy="3448595"/>
           </a:xfrm>
         </p:spPr>
         <p:txBody>
@@ -1380,18 +1198,70 @@
               <a:rPr lang="pt-PT"/>
               <a:t>Quinto nível</a:t>
             </a:r>
-          </a:p>
-        </p:txBody>
-      </p:sp>
-      <p:sp>
-        <p:nvSpPr>
-          <p:cNvPr id="5" name="Marcador de Posição da Data 4">
-            <a:extLst>
-              <a:ext uri="{FF2B5EF4-FFF2-40B4-BE49-F238E27FC236}">
-                <a16:creationId xmlns:a16="http://schemas.microsoft.com/office/drawing/2014/main" id="{91AEFF6E-88CF-4128-A5E2-3AC540A15CC5}"/>
-              </a:ext>
-            </a:extLst>
-          </p:cNvPr>
+            <a:endParaRPr lang="en-US" dirty="0"/>
+          </a:p>
+        </p:txBody>
+      </p:sp>
+      <p:sp>
+        <p:nvSpPr>
+          <p:cNvPr id="4" name="Content Placeholder 3"/>
+          <p:cNvSpPr>
+            <a:spLocks noGrp="1"/>
+          </p:cNvSpPr>
+          <p:nvPr>
+            <p:ph sz="half" idx="2"/>
+          </p:nvPr>
+        </p:nvSpPr>
+        <p:spPr>
+          <a:xfrm>
+            <a:off x="6254140" y="2017343"/>
+            <a:ext cx="4488654" cy="3441520"/>
+          </a:xfrm>
+        </p:spPr>
+        <p:txBody>
+          <a:bodyPr/>
+          <a:lstStyle/>
+          <a:p>
+            <a:pPr lvl="0"/>
+            <a:r>
+              <a:rPr lang="pt-PT"/>
+              <a:t>Editar os estilos de texto do Modelo Global</a:t>
+            </a:r>
+          </a:p>
+          <a:p>
+            <a:pPr lvl="1"/>
+            <a:r>
+              <a:rPr lang="pt-PT"/>
+              <a:t>Segundo nível</a:t>
+            </a:r>
+          </a:p>
+          <a:p>
+            <a:pPr lvl="2"/>
+            <a:r>
+              <a:rPr lang="pt-PT"/>
+              <a:t>Terceiro nível</a:t>
+            </a:r>
+          </a:p>
+          <a:p>
+            <a:pPr lvl="3"/>
+            <a:r>
+              <a:rPr lang="pt-PT"/>
+              <a:t>Quarto nível</a:t>
+            </a:r>
+          </a:p>
+          <a:p>
+            <a:pPr lvl="4"/>
+            <a:r>
+              <a:rPr lang="pt-PT"/>
+              <a:t>Quinto nível</a:t>
+            </a:r>
+            <a:endParaRPr lang="en-US" dirty="0"/>
+          </a:p>
+        </p:txBody>
+      </p:sp>
+      <p:sp>
+        <p:nvSpPr>
+          <p:cNvPr id="5" name="Date Placeholder 4"/>
           <p:cNvSpPr>
             <a:spLocks noGrp="1"/>
           </p:cNvSpPr>
@@ -1406,7 +1276,7 @@
           <a:p>
             <a:fld id="{C2437300-0444-4CE7-907B-B7E5D4BCB335}" type="datetimeFigureOut">
               <a:rPr lang="pt-PT" smtClean="0"/>
-              <a:t>22/04/2018</a:t>
+              <a:t>25/04/2018</a:t>
             </a:fld>
             <a:endParaRPr lang="pt-PT"/>
           </a:p>
@@ -1414,13 +1284,7 @@
       </p:sp>
       <p:sp>
         <p:nvSpPr>
-          <p:cNvPr id="6" name="Marcador de Posição do Rodapé 5">
-            <a:extLst>
-              <a:ext uri="{FF2B5EF4-FFF2-40B4-BE49-F238E27FC236}">
-                <a16:creationId xmlns:a16="http://schemas.microsoft.com/office/drawing/2014/main" id="{2A7147C2-F3A5-4FB1-9B55-B07BCB48B364}"/>
-              </a:ext>
-            </a:extLst>
-          </p:cNvPr>
+          <p:cNvPr id="6" name="Footer Placeholder 5"/>
           <p:cNvSpPr>
             <a:spLocks noGrp="1"/>
           </p:cNvSpPr>
@@ -1439,13 +1303,7 @@
       </p:sp>
       <p:sp>
         <p:nvSpPr>
-          <p:cNvPr id="7" name="Marcador de Posição do Número do Diapositivo 6">
-            <a:extLst>
-              <a:ext uri="{FF2B5EF4-FFF2-40B4-BE49-F238E27FC236}">
-                <a16:creationId xmlns:a16="http://schemas.microsoft.com/office/drawing/2014/main" id="{BCE3179C-0AB1-405F-A13F-95B4EF739400}"/>
-              </a:ext>
-            </a:extLst>
-          </p:cNvPr>
+          <p:cNvPr id="7" name="Slide Number Placeholder 6"/>
           <p:cNvSpPr>
             <a:spLocks noGrp="1"/>
           </p:cNvSpPr>
@@ -1469,7 +1327,7 @@
     </p:spTree>
     <p:extLst>
       <p:ext uri="{BB962C8B-B14F-4D97-AF65-F5344CB8AC3E}">
-        <p14:creationId xmlns:p14="http://schemas.microsoft.com/office/powerpoint/2010/main" val="1789279599"/>
+        <p14:creationId xmlns:p14="http://schemas.microsoft.com/office/powerpoint/2010/main" val="1796677978"/>
       </p:ext>
     </p:extLst>
   </p:cSld>
@@ -1498,13 +1356,7 @@
       </p:grpSpPr>
       <p:sp>
         <p:nvSpPr>
-          <p:cNvPr id="2" name="Título 1">
-            <a:extLst>
-              <a:ext uri="{FF2B5EF4-FFF2-40B4-BE49-F238E27FC236}">
-                <a16:creationId xmlns:a16="http://schemas.microsoft.com/office/drawing/2014/main" id="{1379E155-5B74-4BCE-A0EE-D8553928B406}"/>
-              </a:ext>
-            </a:extLst>
-          </p:cNvPr>
+          <p:cNvPr id="2" name="Title 1"/>
           <p:cNvSpPr>
             <a:spLocks noGrp="1"/>
           </p:cNvSpPr>
@@ -1514,8 +1366,8 @@
         </p:nvSpPr>
         <p:spPr>
           <a:xfrm>
-            <a:off x="839788" y="365125"/>
-            <a:ext cx="10515600" cy="1325563"/>
+            <a:off x="1447191" y="804163"/>
+            <a:ext cx="9295603" cy="1056319"/>
           </a:xfrm>
         </p:spPr>
         <p:txBody>
@@ -1526,18 +1378,13 @@
               <a:rPr lang="pt-PT"/>
               <a:t>Clique para editar o estilo de título do Modelo Global</a:t>
             </a:r>
-          </a:p>
-        </p:txBody>
-      </p:sp>
-      <p:sp>
-        <p:nvSpPr>
-          <p:cNvPr id="3" name="Marcador de Posição do Texto 2">
-            <a:extLst>
-              <a:ext uri="{FF2B5EF4-FFF2-40B4-BE49-F238E27FC236}">
-                <a16:creationId xmlns:a16="http://schemas.microsoft.com/office/drawing/2014/main" id="{AF7908DC-DAEF-4318-9449-3C37FACCE891}"/>
-              </a:ext>
-            </a:extLst>
-          </p:cNvPr>
+            <a:endParaRPr lang="en-US" dirty="0"/>
+          </a:p>
+        </p:txBody>
+      </p:sp>
+      <p:sp>
+        <p:nvSpPr>
+          <p:cNvPr id="3" name="Text Placeholder 2"/>
           <p:cNvSpPr>
             <a:spLocks noGrp="1"/>
           </p:cNvSpPr>
@@ -1547,16 +1394,25 @@
         </p:nvSpPr>
         <p:spPr>
           <a:xfrm>
-            <a:off x="839788" y="1681163"/>
-            <a:ext cx="5157787" cy="823912"/>
+            <a:off x="1447191" y="2019549"/>
+            <a:ext cx="4488794" cy="801943"/>
           </a:xfrm>
         </p:spPr>
         <p:txBody>
-          <a:bodyPr anchor="b"/>
+          <a:bodyPr anchor="b">
+            <a:normAutofit/>
+          </a:bodyPr>
           <a:lstStyle>
             <a:lvl1pPr marL="0" indent="0">
-              <a:buNone/>
-              <a:defRPr sz="2400" b="1"/>
+              <a:lnSpc>
+                <a:spcPct val="100000"/>
+              </a:lnSpc>
+              <a:buNone/>
+              <a:defRPr sz="2200" b="0" cap="all" baseline="0">
+                <a:solidFill>
+                  <a:schemeClr val="accent1"/>
+                </a:solidFill>
+              </a:defRPr>
             </a:lvl1pPr>
             <a:lvl2pPr marL="457200" indent="0">
               <a:buNone/>
@@ -1602,13 +1458,7 @@
       </p:sp>
       <p:sp>
         <p:nvSpPr>
-          <p:cNvPr id="4" name="Marcador de Posição de Conteúdo 3">
-            <a:extLst>
-              <a:ext uri="{FF2B5EF4-FFF2-40B4-BE49-F238E27FC236}">
-                <a16:creationId xmlns:a16="http://schemas.microsoft.com/office/drawing/2014/main" id="{1DE1CE0F-E1EC-4452-9485-51D90B7FEE62}"/>
-              </a:ext>
-            </a:extLst>
-          </p:cNvPr>
+          <p:cNvPr id="4" name="Content Placeholder 3"/>
           <p:cNvSpPr>
             <a:spLocks noGrp="1"/>
           </p:cNvSpPr>
@@ -1618,8 +1468,8 @@
         </p:nvSpPr>
         <p:spPr>
           <a:xfrm>
-            <a:off x="839788" y="2505075"/>
-            <a:ext cx="5157787" cy="3684588"/>
+            <a:off x="1447191" y="2824269"/>
+            <a:ext cx="4488794" cy="2644457"/>
           </a:xfrm>
         </p:spPr>
         <p:txBody>
@@ -1659,18 +1509,13 @@
               <a:rPr lang="pt-PT"/>
               <a:t>Quinto nível</a:t>
             </a:r>
-          </a:p>
-        </p:txBody>
-      </p:sp>
-      <p:sp>
-        <p:nvSpPr>
-          <p:cNvPr id="5" name="Marcador de Posição do Texto 4">
-            <a:extLst>
-              <a:ext uri="{FF2B5EF4-FFF2-40B4-BE49-F238E27FC236}">
-                <a16:creationId xmlns:a16="http://schemas.microsoft.com/office/drawing/2014/main" id="{8CB1BE89-0185-4A99-860E-6CE8A4187BE1}"/>
-              </a:ext>
-            </a:extLst>
-          </p:cNvPr>
+            <a:endParaRPr lang="en-US" dirty="0"/>
+          </a:p>
+        </p:txBody>
+      </p:sp>
+      <p:sp>
+        <p:nvSpPr>
+          <p:cNvPr id="5" name="Text Placeholder 4"/>
           <p:cNvSpPr>
             <a:spLocks noGrp="1"/>
           </p:cNvSpPr>
@@ -1680,16 +1525,25 @@
         </p:nvSpPr>
         <p:spPr>
           <a:xfrm>
-            <a:off x="6172200" y="1681163"/>
-            <a:ext cx="5183188" cy="823912"/>
+            <a:off x="6256025" y="2023003"/>
+            <a:ext cx="4488794" cy="802237"/>
           </a:xfrm>
         </p:spPr>
         <p:txBody>
-          <a:bodyPr anchor="b"/>
+          <a:bodyPr anchor="b">
+            <a:normAutofit/>
+          </a:bodyPr>
           <a:lstStyle>
             <a:lvl1pPr marL="0" indent="0">
-              <a:buNone/>
-              <a:defRPr sz="2400" b="1"/>
+              <a:lnSpc>
+                <a:spcPct val="100000"/>
+              </a:lnSpc>
+              <a:buNone/>
+              <a:defRPr sz="2200" b="0" cap="all" baseline="0">
+                <a:solidFill>
+                  <a:schemeClr val="accent1"/>
+                </a:solidFill>
+              </a:defRPr>
             </a:lvl1pPr>
             <a:lvl2pPr marL="457200" indent="0">
               <a:buNone/>
@@ -1735,13 +1589,7 @@
       </p:sp>
       <p:sp>
         <p:nvSpPr>
-          <p:cNvPr id="6" name="Marcador de Posição de Conteúdo 5">
-            <a:extLst>
-              <a:ext uri="{FF2B5EF4-FFF2-40B4-BE49-F238E27FC236}">
-                <a16:creationId xmlns:a16="http://schemas.microsoft.com/office/drawing/2014/main" id="{F0DB1B91-8AEE-40D0-BC9B-B51DC12327AA}"/>
-              </a:ext>
-            </a:extLst>
-          </p:cNvPr>
+          <p:cNvPr id="6" name="Content Placeholder 5"/>
           <p:cNvSpPr>
             <a:spLocks noGrp="1"/>
           </p:cNvSpPr>
@@ -1751,8 +1599,8 @@
         </p:nvSpPr>
         <p:spPr>
           <a:xfrm>
-            <a:off x="6172200" y="2505075"/>
-            <a:ext cx="5183188" cy="3684588"/>
+            <a:off x="6256025" y="2821491"/>
+            <a:ext cx="4488794" cy="2637371"/>
           </a:xfrm>
         </p:spPr>
         <p:txBody>
@@ -1792,18 +1640,13 @@
               <a:rPr lang="pt-PT"/>
               <a:t>Quinto nível</a:t>
             </a:r>
-          </a:p>
-        </p:txBody>
-      </p:sp>
-      <p:sp>
-        <p:nvSpPr>
-          <p:cNvPr id="7" name="Marcador de Posição da Data 6">
-            <a:extLst>
-              <a:ext uri="{FF2B5EF4-FFF2-40B4-BE49-F238E27FC236}">
-                <a16:creationId xmlns:a16="http://schemas.microsoft.com/office/drawing/2014/main" id="{7BAF394C-C653-4CB3-91EF-0802375D5BE7}"/>
-              </a:ext>
-            </a:extLst>
-          </p:cNvPr>
+            <a:endParaRPr lang="en-US" dirty="0"/>
+          </a:p>
+        </p:txBody>
+      </p:sp>
+      <p:sp>
+        <p:nvSpPr>
+          <p:cNvPr id="7" name="Date Placeholder 6"/>
           <p:cNvSpPr>
             <a:spLocks noGrp="1"/>
           </p:cNvSpPr>
@@ -1818,7 +1661,7 @@
           <a:p>
             <a:fld id="{C2437300-0444-4CE7-907B-B7E5D4BCB335}" type="datetimeFigureOut">
               <a:rPr lang="pt-PT" smtClean="0"/>
-              <a:t>22/04/2018</a:t>
+              <a:t>25/04/2018</a:t>
             </a:fld>
             <a:endParaRPr lang="pt-PT"/>
           </a:p>
@@ -1826,13 +1669,7 @@
       </p:sp>
       <p:sp>
         <p:nvSpPr>
-          <p:cNvPr id="8" name="Marcador de Posição do Rodapé 7">
-            <a:extLst>
-              <a:ext uri="{FF2B5EF4-FFF2-40B4-BE49-F238E27FC236}">
-                <a16:creationId xmlns:a16="http://schemas.microsoft.com/office/drawing/2014/main" id="{0F5C96D7-33FC-4EA9-9103-CE1760C7D84B}"/>
-              </a:ext>
-            </a:extLst>
-          </p:cNvPr>
+          <p:cNvPr id="8" name="Footer Placeholder 7"/>
           <p:cNvSpPr>
             <a:spLocks noGrp="1"/>
           </p:cNvSpPr>
@@ -1851,13 +1688,7 @@
       </p:sp>
       <p:sp>
         <p:nvSpPr>
-          <p:cNvPr id="9" name="Marcador de Posição do Número do Diapositivo 8">
-            <a:extLst>
-              <a:ext uri="{FF2B5EF4-FFF2-40B4-BE49-F238E27FC236}">
-                <a16:creationId xmlns:a16="http://schemas.microsoft.com/office/drawing/2014/main" id="{9197BBAD-9832-4295-BC71-135E95F3D1D6}"/>
-              </a:ext>
-            </a:extLst>
-          </p:cNvPr>
+          <p:cNvPr id="9" name="Slide Number Placeholder 8"/>
           <p:cNvSpPr>
             <a:spLocks noGrp="1"/>
           </p:cNvSpPr>
@@ -1881,7 +1712,7 @@
     </p:spTree>
     <p:extLst>
       <p:ext uri="{BB962C8B-B14F-4D97-AF65-F5344CB8AC3E}">
-        <p14:creationId xmlns:p14="http://schemas.microsoft.com/office/powerpoint/2010/main" val="2621049405"/>
+        <p14:creationId xmlns:p14="http://schemas.microsoft.com/office/powerpoint/2010/main" val="2920600365"/>
       </p:ext>
     </p:extLst>
   </p:cSld>
@@ -1910,13 +1741,7 @@
       </p:grpSpPr>
       <p:sp>
         <p:nvSpPr>
-          <p:cNvPr id="2" name="Título 1">
-            <a:extLst>
-              <a:ext uri="{FF2B5EF4-FFF2-40B4-BE49-F238E27FC236}">
-                <a16:creationId xmlns:a16="http://schemas.microsoft.com/office/drawing/2014/main" id="{D0A0F910-3B12-4D47-9F9D-04D9558B271D}"/>
-              </a:ext>
-            </a:extLst>
-          </p:cNvPr>
+          <p:cNvPr id="2" name="Title 1"/>
           <p:cNvSpPr>
             <a:spLocks noGrp="1"/>
           </p:cNvSpPr>
@@ -1933,18 +1758,13 @@
               <a:rPr lang="pt-PT"/>
               <a:t>Clique para editar o estilo de título do Modelo Global</a:t>
             </a:r>
-          </a:p>
-        </p:txBody>
-      </p:sp>
-      <p:sp>
-        <p:nvSpPr>
-          <p:cNvPr id="3" name="Marcador de Posição da Data 2">
-            <a:extLst>
-              <a:ext uri="{FF2B5EF4-FFF2-40B4-BE49-F238E27FC236}">
-                <a16:creationId xmlns:a16="http://schemas.microsoft.com/office/drawing/2014/main" id="{DB84AF98-585A-4994-A1B5-91807925C26D}"/>
-              </a:ext>
-            </a:extLst>
-          </p:cNvPr>
+            <a:endParaRPr lang="en-US" dirty="0"/>
+          </a:p>
+        </p:txBody>
+      </p:sp>
+      <p:sp>
+        <p:nvSpPr>
+          <p:cNvPr id="3" name="Date Placeholder 2"/>
           <p:cNvSpPr>
             <a:spLocks noGrp="1"/>
           </p:cNvSpPr>
@@ -1959,7 +1779,7 @@
           <a:p>
             <a:fld id="{C2437300-0444-4CE7-907B-B7E5D4BCB335}" type="datetimeFigureOut">
               <a:rPr lang="pt-PT" smtClean="0"/>
-              <a:t>22/04/2018</a:t>
+              <a:t>25/04/2018</a:t>
             </a:fld>
             <a:endParaRPr lang="pt-PT"/>
           </a:p>
@@ -1967,13 +1787,7 @@
       </p:sp>
       <p:sp>
         <p:nvSpPr>
-          <p:cNvPr id="4" name="Marcador de Posição do Rodapé 3">
-            <a:extLst>
-              <a:ext uri="{FF2B5EF4-FFF2-40B4-BE49-F238E27FC236}">
-                <a16:creationId xmlns:a16="http://schemas.microsoft.com/office/drawing/2014/main" id="{B94D70BA-89D2-40DB-B5D2-E8D436874DC9}"/>
-              </a:ext>
-            </a:extLst>
-          </p:cNvPr>
+          <p:cNvPr id="4" name="Footer Placeholder 3"/>
           <p:cNvSpPr>
             <a:spLocks noGrp="1"/>
           </p:cNvSpPr>
@@ -1992,13 +1806,7 @@
       </p:sp>
       <p:sp>
         <p:nvSpPr>
-          <p:cNvPr id="5" name="Marcador de Posição do Número do Diapositivo 4">
-            <a:extLst>
-              <a:ext uri="{FF2B5EF4-FFF2-40B4-BE49-F238E27FC236}">
-                <a16:creationId xmlns:a16="http://schemas.microsoft.com/office/drawing/2014/main" id="{623B1869-7A4C-4483-8D9E-FECC4E753E46}"/>
-              </a:ext>
-            </a:extLst>
-          </p:cNvPr>
+          <p:cNvPr id="5" name="Slide Number Placeholder 4"/>
           <p:cNvSpPr>
             <a:spLocks noGrp="1"/>
           </p:cNvSpPr>
@@ -2022,7 +1830,7 @@
     </p:spTree>
     <p:extLst>
       <p:ext uri="{BB962C8B-B14F-4D97-AF65-F5344CB8AC3E}">
-        <p14:creationId xmlns:p14="http://schemas.microsoft.com/office/powerpoint/2010/main" val="3533677924"/>
+        <p14:creationId xmlns:p14="http://schemas.microsoft.com/office/powerpoint/2010/main" val="1409142192"/>
       </p:ext>
     </p:extLst>
   </p:cSld>
@@ -2051,13 +1859,7 @@
       </p:grpSpPr>
       <p:sp>
         <p:nvSpPr>
-          <p:cNvPr id="2" name="Marcador de Posição da Data 1">
-            <a:extLst>
-              <a:ext uri="{FF2B5EF4-FFF2-40B4-BE49-F238E27FC236}">
-                <a16:creationId xmlns:a16="http://schemas.microsoft.com/office/drawing/2014/main" id="{BC434C13-DF01-47C3-BF19-C320E207CA8D}"/>
-              </a:ext>
-            </a:extLst>
-          </p:cNvPr>
+          <p:cNvPr id="2" name="Date Placeholder 1"/>
           <p:cNvSpPr>
             <a:spLocks noGrp="1"/>
           </p:cNvSpPr>
@@ -2072,7 +1874,7 @@
           <a:p>
             <a:fld id="{C2437300-0444-4CE7-907B-B7E5D4BCB335}" type="datetimeFigureOut">
               <a:rPr lang="pt-PT" smtClean="0"/>
-              <a:t>22/04/2018</a:t>
+              <a:t>25/04/2018</a:t>
             </a:fld>
             <a:endParaRPr lang="pt-PT"/>
           </a:p>
@@ -2080,13 +1882,7 @@
       </p:sp>
       <p:sp>
         <p:nvSpPr>
-          <p:cNvPr id="3" name="Marcador de Posição do Rodapé 2">
-            <a:extLst>
-              <a:ext uri="{FF2B5EF4-FFF2-40B4-BE49-F238E27FC236}">
-                <a16:creationId xmlns:a16="http://schemas.microsoft.com/office/drawing/2014/main" id="{95D3E195-992E-4519-A518-AE3A111023D9}"/>
-              </a:ext>
-            </a:extLst>
-          </p:cNvPr>
+          <p:cNvPr id="3" name="Footer Placeholder 2"/>
           <p:cNvSpPr>
             <a:spLocks noGrp="1"/>
           </p:cNvSpPr>
@@ -2105,13 +1901,7 @@
       </p:sp>
       <p:sp>
         <p:nvSpPr>
-          <p:cNvPr id="4" name="Marcador de Posição do Número do Diapositivo 3">
-            <a:extLst>
-              <a:ext uri="{FF2B5EF4-FFF2-40B4-BE49-F238E27FC236}">
-                <a16:creationId xmlns:a16="http://schemas.microsoft.com/office/drawing/2014/main" id="{0AFF1970-64C9-426F-AB77-E9C1397A57E7}"/>
-              </a:ext>
-            </a:extLst>
-          </p:cNvPr>
+          <p:cNvPr id="4" name="Slide Number Placeholder 3"/>
           <p:cNvSpPr>
             <a:spLocks noGrp="1"/>
           </p:cNvSpPr>
@@ -2135,7 +1925,7 @@
     </p:spTree>
     <p:extLst>
       <p:ext uri="{BB962C8B-B14F-4D97-AF65-F5344CB8AC3E}">
-        <p14:creationId xmlns:p14="http://schemas.microsoft.com/office/powerpoint/2010/main" val="3918019703"/>
+        <p14:creationId xmlns:p14="http://schemas.microsoft.com/office/powerpoint/2010/main" val="1808530544"/>
       </p:ext>
     </p:extLst>
   </p:cSld>
@@ -2164,13 +1954,7 @@
       </p:grpSpPr>
       <p:sp>
         <p:nvSpPr>
-          <p:cNvPr id="2" name="Título 1">
-            <a:extLst>
-              <a:ext uri="{FF2B5EF4-FFF2-40B4-BE49-F238E27FC236}">
-                <a16:creationId xmlns:a16="http://schemas.microsoft.com/office/drawing/2014/main" id="{16719588-1CF2-4D5E-94B5-468FBDC2F3F9}"/>
-              </a:ext>
-            </a:extLst>
-          </p:cNvPr>
+          <p:cNvPr id="2" name="Title 1"/>
           <p:cNvSpPr>
             <a:spLocks noGrp="1"/>
           </p:cNvSpPr>
@@ -2180,15 +1964,17 @@
         </p:nvSpPr>
         <p:spPr>
           <a:xfrm>
-            <a:off x="839788" y="457200"/>
-            <a:ext cx="3932237" cy="1600200"/>
+            <a:off x="1444671" y="798973"/>
+            <a:ext cx="2961967" cy="2406518"/>
           </a:xfrm>
         </p:spPr>
         <p:txBody>
-          <a:bodyPr anchor="b"/>
+          <a:bodyPr anchor="b">
+            <a:normAutofit/>
+          </a:bodyPr>
           <a:lstStyle>
-            <a:lvl1pPr>
-              <a:defRPr sz="3200"/>
+            <a:lvl1pPr algn="l">
+              <a:defRPr sz="2400"/>
             </a:lvl1pPr>
           </a:lstStyle>
           <a:p>
@@ -2196,18 +1982,13 @@
               <a:rPr lang="pt-PT"/>
               <a:t>Clique para editar o estilo de título do Modelo Global</a:t>
             </a:r>
-          </a:p>
-        </p:txBody>
-      </p:sp>
-      <p:sp>
-        <p:nvSpPr>
-          <p:cNvPr id="3" name="Marcador de Posição de Conteúdo 2">
-            <a:extLst>
-              <a:ext uri="{FF2B5EF4-FFF2-40B4-BE49-F238E27FC236}">
-                <a16:creationId xmlns:a16="http://schemas.microsoft.com/office/drawing/2014/main" id="{6654127F-FDC2-454A-8B53-2A440DD10ABF}"/>
-              </a:ext>
-            </a:extLst>
-          </p:cNvPr>
+            <a:endParaRPr lang="en-US" dirty="0"/>
+          </a:p>
+        </p:txBody>
+      </p:sp>
+      <p:sp>
+        <p:nvSpPr>
+          <p:cNvPr id="3" name="Content Placeholder 2"/>
           <p:cNvSpPr>
             <a:spLocks noGrp="1"/>
           </p:cNvSpPr>
@@ -2217,104 +1998,71 @@
         </p:nvSpPr>
         <p:spPr>
           <a:xfrm>
-            <a:off x="5183188" y="987425"/>
-            <a:ext cx="6172200" cy="4873625"/>
+            <a:off x="4730324" y="798974"/>
+            <a:ext cx="6012470" cy="4658826"/>
           </a:xfrm>
         </p:spPr>
         <p:txBody>
+          <a:bodyPr anchor="ctr"/>
+          <a:lstStyle/>
+          <a:p>
+            <a:pPr lvl="0"/>
+            <a:r>
+              <a:rPr lang="pt-PT"/>
+              <a:t>Editar os estilos de texto do Modelo Global</a:t>
+            </a:r>
+          </a:p>
+          <a:p>
+            <a:pPr lvl="1"/>
+            <a:r>
+              <a:rPr lang="pt-PT"/>
+              <a:t>Segundo nível</a:t>
+            </a:r>
+          </a:p>
+          <a:p>
+            <a:pPr lvl="2"/>
+            <a:r>
+              <a:rPr lang="pt-PT"/>
+              <a:t>Terceiro nível</a:t>
+            </a:r>
+          </a:p>
+          <a:p>
+            <a:pPr lvl="3"/>
+            <a:r>
+              <a:rPr lang="pt-PT"/>
+              <a:t>Quarto nível</a:t>
+            </a:r>
+          </a:p>
+          <a:p>
+            <a:pPr lvl="4"/>
+            <a:r>
+              <a:rPr lang="pt-PT"/>
+              <a:t>Quinto nível</a:t>
+            </a:r>
+            <a:endParaRPr lang="en-US" dirty="0"/>
+          </a:p>
+        </p:txBody>
+      </p:sp>
+      <p:sp>
+        <p:nvSpPr>
+          <p:cNvPr id="4" name="Text Placeholder 3"/>
+          <p:cNvSpPr>
+            <a:spLocks noGrp="1"/>
+          </p:cNvSpPr>
+          <p:nvPr>
+            <p:ph type="body" sz="half" idx="2"/>
+          </p:nvPr>
+        </p:nvSpPr>
+        <p:spPr>
+          <a:xfrm>
+            <a:off x="1444671" y="3205491"/>
+            <a:ext cx="2961967" cy="2248181"/>
+          </a:xfrm>
+        </p:spPr>
+        <p:txBody>
           <a:bodyPr/>
           <a:lstStyle>
-            <a:lvl1pPr>
-              <a:defRPr sz="3200"/>
-            </a:lvl1pPr>
-            <a:lvl2pPr>
-              <a:defRPr sz="2800"/>
-            </a:lvl2pPr>
-            <a:lvl3pPr>
-              <a:defRPr sz="2400"/>
-            </a:lvl3pPr>
-            <a:lvl4pPr>
-              <a:defRPr sz="2000"/>
-            </a:lvl4pPr>
-            <a:lvl5pPr>
-              <a:defRPr sz="2000"/>
-            </a:lvl5pPr>
-            <a:lvl6pPr>
-              <a:defRPr sz="2000"/>
-            </a:lvl6pPr>
-            <a:lvl7pPr>
-              <a:defRPr sz="2000"/>
-            </a:lvl7pPr>
-            <a:lvl8pPr>
-              <a:defRPr sz="2000"/>
-            </a:lvl8pPr>
-            <a:lvl9pPr>
-              <a:defRPr sz="2000"/>
-            </a:lvl9pPr>
-          </a:lstStyle>
-          <a:p>
-            <a:pPr lvl="0"/>
-            <a:r>
-              <a:rPr lang="pt-PT"/>
-              <a:t>Editar os estilos de texto do Modelo Global</a:t>
-            </a:r>
-          </a:p>
-          <a:p>
-            <a:pPr lvl="1"/>
-            <a:r>
-              <a:rPr lang="pt-PT"/>
-              <a:t>Segundo nível</a:t>
-            </a:r>
-          </a:p>
-          <a:p>
-            <a:pPr lvl="2"/>
-            <a:r>
-              <a:rPr lang="pt-PT"/>
-              <a:t>Terceiro nível</a:t>
-            </a:r>
-          </a:p>
-          <a:p>
-            <a:pPr lvl="3"/>
-            <a:r>
-              <a:rPr lang="pt-PT"/>
-              <a:t>Quarto nível</a:t>
-            </a:r>
-          </a:p>
-          <a:p>
-            <a:pPr lvl="4"/>
-            <a:r>
-              <a:rPr lang="pt-PT"/>
-              <a:t>Quinto nível</a:t>
-            </a:r>
-          </a:p>
-        </p:txBody>
-      </p:sp>
-      <p:sp>
-        <p:nvSpPr>
-          <p:cNvPr id="4" name="Marcador de Posição do Texto 3">
-            <a:extLst>
-              <a:ext uri="{FF2B5EF4-FFF2-40B4-BE49-F238E27FC236}">
-                <a16:creationId xmlns:a16="http://schemas.microsoft.com/office/drawing/2014/main" id="{ACA4B778-775E-4B67-975C-13B3ADC5AF59}"/>
-              </a:ext>
-            </a:extLst>
-          </p:cNvPr>
-          <p:cNvSpPr>
-            <a:spLocks noGrp="1"/>
-          </p:cNvSpPr>
-          <p:nvPr>
-            <p:ph type="body" sz="half" idx="2"/>
-          </p:nvPr>
-        </p:nvSpPr>
-        <p:spPr>
-          <a:xfrm>
-            <a:off x="839788" y="2057400"/>
-            <a:ext cx="3932237" cy="3811588"/>
-          </a:xfrm>
-        </p:spPr>
-        <p:txBody>
-          <a:bodyPr/>
-          <a:lstStyle>
-            <a:lvl1pPr marL="0" indent="0">
+            <a:lvl1pPr marL="0" indent="0" algn="l">
               <a:buNone/>
               <a:defRPr sz="1600"/>
             </a:lvl1pPr>
@@ -2362,13 +2110,7 @@
       </p:sp>
       <p:sp>
         <p:nvSpPr>
-          <p:cNvPr id="5" name="Marcador de Posição da Data 4">
-            <a:extLst>
-              <a:ext uri="{FF2B5EF4-FFF2-40B4-BE49-F238E27FC236}">
-                <a16:creationId xmlns:a16="http://schemas.microsoft.com/office/drawing/2014/main" id="{95C18CA8-0157-4F34-BBC1-C5E1AC1B7FEA}"/>
-              </a:ext>
-            </a:extLst>
-          </p:cNvPr>
+          <p:cNvPr id="5" name="Date Placeholder 4"/>
           <p:cNvSpPr>
             <a:spLocks noGrp="1"/>
           </p:cNvSpPr>
@@ -2383,7 +2125,7 @@
           <a:p>
             <a:fld id="{C2437300-0444-4CE7-907B-B7E5D4BCB335}" type="datetimeFigureOut">
               <a:rPr lang="pt-PT" smtClean="0"/>
-              <a:t>22/04/2018</a:t>
+              <a:t>25/04/2018</a:t>
             </a:fld>
             <a:endParaRPr lang="pt-PT"/>
           </a:p>
@@ -2391,13 +2133,7 @@
       </p:sp>
       <p:sp>
         <p:nvSpPr>
-          <p:cNvPr id="6" name="Marcador de Posição do Rodapé 5">
-            <a:extLst>
-              <a:ext uri="{FF2B5EF4-FFF2-40B4-BE49-F238E27FC236}">
-                <a16:creationId xmlns:a16="http://schemas.microsoft.com/office/drawing/2014/main" id="{0C848E5F-54BE-4627-9D05-5A1EBAC2CE27}"/>
-              </a:ext>
-            </a:extLst>
-          </p:cNvPr>
+          <p:cNvPr id="6" name="Footer Placeholder 5"/>
           <p:cNvSpPr>
             <a:spLocks noGrp="1"/>
           </p:cNvSpPr>
@@ -2416,13 +2152,7 @@
       </p:sp>
       <p:sp>
         <p:nvSpPr>
-          <p:cNvPr id="7" name="Marcador de Posição do Número do Diapositivo 6">
-            <a:extLst>
-              <a:ext uri="{FF2B5EF4-FFF2-40B4-BE49-F238E27FC236}">
-                <a16:creationId xmlns:a16="http://schemas.microsoft.com/office/drawing/2014/main" id="{E193B19B-832E-4438-BB57-10913A2CE867}"/>
-              </a:ext>
-            </a:extLst>
-          </p:cNvPr>
+          <p:cNvPr id="7" name="Slide Number Placeholder 6"/>
           <p:cNvSpPr>
             <a:spLocks noGrp="1"/>
           </p:cNvSpPr>
@@ -2446,7 +2176,7 @@
     </p:spTree>
     <p:extLst>
       <p:ext uri="{BB962C8B-B14F-4D97-AF65-F5344CB8AC3E}">
-        <p14:creationId xmlns:p14="http://schemas.microsoft.com/office/powerpoint/2010/main" val="3340339800"/>
+        <p14:creationId xmlns:p14="http://schemas.microsoft.com/office/powerpoint/2010/main" val="1782795381"/>
       </p:ext>
     </p:extLst>
   </p:cSld>
@@ -2473,15 +2203,148 @@
           <a:chExt cx="0" cy="0"/>
         </a:xfrm>
       </p:grpSpPr>
-      <p:sp>
-        <p:nvSpPr>
-          <p:cNvPr id="2" name="Título 1">
-            <a:extLst>
-              <a:ext uri="{FF2B5EF4-FFF2-40B4-BE49-F238E27FC236}">
-                <a16:creationId xmlns:a16="http://schemas.microsoft.com/office/drawing/2014/main" id="{7DFE20A9-6DB7-45BB-A886-23E223EC68B1}"/>
-              </a:ext>
-            </a:extLst>
-          </p:cNvPr>
+      <p:grpSp>
+        <p:nvGrpSpPr>
+          <p:cNvPr id="9" name="Group 8"/>
+          <p:cNvGrpSpPr/>
+          <p:nvPr/>
+        </p:nvGrpSpPr>
+        <p:grpSpPr>
+          <a:xfrm>
+            <a:off x="7477387" y="482170"/>
+            <a:ext cx="4074533" cy="5149101"/>
+            <a:chOff x="7477387" y="482170"/>
+            <a:chExt cx="4074533" cy="5149101"/>
+          </a:xfrm>
+        </p:grpSpPr>
+        <p:sp>
+          <p:nvSpPr>
+            <p:cNvPr id="18" name="Rectangle 17"/>
+            <p:cNvSpPr/>
+            <p:nvPr/>
+          </p:nvSpPr>
+          <p:spPr>
+            <a:xfrm>
+              <a:off x="7477387" y="482170"/>
+              <a:ext cx="4074533" cy="5149101"/>
+            </a:xfrm>
+            <a:prstGeom prst="rect">
+              <a:avLst/>
+            </a:prstGeom>
+            <a:blipFill dpi="0" rotWithShape="1">
+              <a:blip r:embed="rId2">
+                <a:alphaModFix amt="30000"/>
+              </a:blip>
+              <a:srcRect/>
+              <a:tile tx="0" ty="0" sx="100000" sy="100000" flip="none" algn="ctr"/>
+            </a:blipFill>
+            <a:ln w="76200" cmpd="sng">
+              <a:noFill/>
+              <a:miter lim="800000"/>
+            </a:ln>
+            <a:effectLst>
+              <a:outerShdw blurRad="127000" dist="228600" dir="4740000" sx="98000" sy="98000" algn="tl" rotWithShape="0">
+                <a:srgbClr val="000000">
+                  <a:alpha val="34000"/>
+                </a:srgbClr>
+              </a:outerShdw>
+            </a:effectLst>
+            <a:scene3d>
+              <a:camera prst="orthographicFront"/>
+              <a:lightRig rig="threePt" dir="t"/>
+            </a:scene3d>
+            <a:sp3d extrusionH="76200" contourW="12700" prstMaterial="matte">
+              <a:bevelT w="152400" h="50800" prst="softRound"/>
+              <a:extrusionClr>
+                <a:schemeClr val="tx2"/>
+              </a:extrusionClr>
+              <a:contourClr>
+                <a:schemeClr val="bg2"/>
+              </a:contourClr>
+            </a:sp3d>
+          </p:spPr>
+          <p:style>
+            <a:lnRef idx="1">
+              <a:schemeClr val="accent1"/>
+            </a:lnRef>
+            <a:fillRef idx="3">
+              <a:schemeClr val="accent1"/>
+            </a:fillRef>
+            <a:effectRef idx="2">
+              <a:schemeClr val="accent1"/>
+            </a:effectRef>
+            <a:fontRef idx="minor">
+              <a:schemeClr val="lt1"/>
+            </a:fontRef>
+          </p:style>
+        </p:sp>
+        <p:sp>
+          <p:nvSpPr>
+            <p:cNvPr id="19" name="Rectangle 18"/>
+            <p:cNvSpPr/>
+            <p:nvPr/>
+          </p:nvSpPr>
+          <p:spPr>
+            <a:xfrm>
+              <a:off x="7790446" y="812506"/>
+              <a:ext cx="3450289" cy="4466452"/>
+            </a:xfrm>
+            <a:prstGeom prst="rect">
+              <a:avLst/>
+            </a:prstGeom>
+            <a:gradFill>
+              <a:gsLst>
+                <a:gs pos="0">
+                  <a:srgbClr val="DADADA"/>
+                </a:gs>
+                <a:gs pos="100000">
+                  <a:srgbClr val="FFFFFE"/>
+                </a:gs>
+              </a:gsLst>
+              <a:lin ang="16200000" scaled="0"/>
+            </a:gradFill>
+            <a:ln w="38100" cmpd="sng">
+              <a:solidFill>
+                <a:schemeClr val="tx2">
+                  <a:lumMod val="25000"/>
+                </a:schemeClr>
+              </a:solidFill>
+              <a:miter lim="800000"/>
+            </a:ln>
+            <a:effectLst>
+              <a:innerShdw blurRad="63500" dist="88900" dir="14100000">
+                <a:srgbClr val="000000">
+                  <a:alpha val="30000"/>
+                </a:srgbClr>
+              </a:innerShdw>
+            </a:effectLst>
+            <a:scene3d>
+              <a:camera prst="orthographicFront"/>
+              <a:lightRig rig="threePt" dir="t"/>
+            </a:scene3d>
+            <a:sp3d>
+              <a:bevelT prst="relaxedInset"/>
+            </a:sp3d>
+          </p:spPr>
+          <p:style>
+            <a:lnRef idx="1">
+              <a:schemeClr val="accent1"/>
+            </a:lnRef>
+            <a:fillRef idx="3">
+              <a:schemeClr val="accent1"/>
+            </a:fillRef>
+            <a:effectRef idx="2">
+              <a:schemeClr val="accent1"/>
+            </a:effectRef>
+            <a:fontRef idx="minor">
+              <a:schemeClr val="lt1"/>
+            </a:fontRef>
+          </p:style>
+        </p:sp>
+      </p:grpSp>
+      <p:sp>
+        <p:nvSpPr>
+          <p:cNvPr id="2" name="Title 1"/>
           <p:cNvSpPr>
             <a:spLocks noGrp="1"/>
           </p:cNvSpPr>
@@ -2491,12 +2354,14 @@
         </p:nvSpPr>
         <p:spPr>
           <a:xfrm>
-            <a:off x="839788" y="457200"/>
-            <a:ext cx="3932237" cy="1600200"/>
+            <a:off x="1451206" y="1129512"/>
+            <a:ext cx="5532328" cy="1922299"/>
           </a:xfrm>
         </p:spPr>
         <p:txBody>
-          <a:bodyPr anchor="b"/>
+          <a:bodyPr anchor="b">
+            <a:normAutofit/>
+          </a:bodyPr>
           <a:lstStyle>
             <a:lvl1pPr>
               <a:defRPr sz="3200"/>
@@ -2507,20 +2372,15 @@
               <a:rPr lang="pt-PT"/>
               <a:t>Clique para editar o estilo de título do Modelo Global</a:t>
             </a:r>
-          </a:p>
-        </p:txBody>
-      </p:sp>
-      <p:sp>
-        <p:nvSpPr>
-          <p:cNvPr id="3" name="Marcador de Posição da Imagem 2">
-            <a:extLst>
-              <a:ext uri="{FF2B5EF4-FFF2-40B4-BE49-F238E27FC236}">
-                <a16:creationId xmlns:a16="http://schemas.microsoft.com/office/drawing/2014/main" id="{4D94AF30-2561-460C-8C32-BE78AB4FB9E4}"/>
-              </a:ext>
-            </a:extLst>
-          </p:cNvPr>
-          <p:cNvSpPr>
-            <a:spLocks noGrp="1"/>
+            <a:endParaRPr lang="en-US" dirty="0"/>
+          </a:p>
+        </p:txBody>
+      </p:sp>
+      <p:sp>
+        <p:nvSpPr>
+          <p:cNvPr id="3" name="Picture Placeholder 2"/>
+          <p:cNvSpPr>
+            <a:spLocks noGrp="1" noChangeAspect="1"/>
           </p:cNvSpPr>
           <p:nvPr>
             <p:ph type="pic" idx="1"/>
@@ -2528,83 +2388,65 @@
         </p:nvSpPr>
         <p:spPr>
           <a:xfrm>
-            <a:off x="5183188" y="987425"/>
-            <a:ext cx="6172200" cy="4873625"/>
+            <a:off x="8124389" y="1122542"/>
+            <a:ext cx="2791171" cy="3866327"/>
+          </a:xfrm>
+          <a:solidFill>
+            <a:schemeClr val="bg1">
+              <a:lumMod val="50000"/>
+              <a:lumOff val="50000"/>
+              <a:alpha val="80000"/>
+            </a:schemeClr>
+          </a:solidFill>
+          <a:ln w="9525" cap="sq">
+            <a:noFill/>
+            <a:miter lim="800000"/>
+          </a:ln>
+          <a:effectLst/>
+        </p:spPr>
+        <p:txBody>
+          <a:bodyPr vert="horz" lIns="91440" tIns="45720" rIns="91440" bIns="45720" rtlCol="0" anchor="t">
+            <a:normAutofit/>
+          </a:bodyPr>
+          <a:lstStyle>
+            <a:lvl1pPr>
+              <a:defRPr lang="en-US" sz="3200" dirty="0"/>
+            </a:lvl1pPr>
+          </a:lstStyle>
+          <a:p>
+            <a:pPr lvl="0" algn="ctr"/>
+            <a:r>
+              <a:rPr lang="pt-PT"/>
+              <a:t>Clique no ícone para adicionar uma imagem</a:t>
+            </a:r>
+            <a:endParaRPr lang="en-US" dirty="0"/>
+          </a:p>
+        </p:txBody>
+      </p:sp>
+      <p:sp>
+        <p:nvSpPr>
+          <p:cNvPr id="4" name="Text Placeholder 3"/>
+          <p:cNvSpPr>
+            <a:spLocks noGrp="1"/>
+          </p:cNvSpPr>
+          <p:nvPr>
+            <p:ph type="body" sz="half" idx="2"/>
+          </p:nvPr>
+        </p:nvSpPr>
+        <p:spPr>
+          <a:xfrm>
+            <a:off x="1450329" y="3059600"/>
+            <a:ext cx="5524404" cy="2090134"/>
           </a:xfrm>
         </p:spPr>
         <p:txBody>
-          <a:bodyPr/>
+          <a:bodyPr>
+            <a:normAutofit/>
+          </a:bodyPr>
           <a:lstStyle>
-            <a:lvl1pPr marL="0" indent="0">
-              <a:buNone/>
-              <a:defRPr sz="3200"/>
-            </a:lvl1pPr>
-            <a:lvl2pPr marL="457200" indent="0">
-              <a:buNone/>
-              <a:defRPr sz="2800"/>
-            </a:lvl2pPr>
-            <a:lvl3pPr marL="914400" indent="0">
-              <a:buNone/>
-              <a:defRPr sz="2400"/>
-            </a:lvl3pPr>
-            <a:lvl4pPr marL="1371600" indent="0">
-              <a:buNone/>
-              <a:defRPr sz="2000"/>
-            </a:lvl4pPr>
-            <a:lvl5pPr marL="1828800" indent="0">
-              <a:buNone/>
-              <a:defRPr sz="2000"/>
-            </a:lvl5pPr>
-            <a:lvl6pPr marL="2286000" indent="0">
-              <a:buNone/>
-              <a:defRPr sz="2000"/>
-            </a:lvl6pPr>
-            <a:lvl7pPr marL="2743200" indent="0">
-              <a:buNone/>
-              <a:defRPr sz="2000"/>
-            </a:lvl7pPr>
-            <a:lvl8pPr marL="3200400" indent="0">
-              <a:buNone/>
-              <a:defRPr sz="2000"/>
-            </a:lvl8pPr>
-            <a:lvl9pPr marL="3657600" indent="0">
-              <a:buNone/>
-              <a:defRPr sz="2000"/>
-            </a:lvl9pPr>
-          </a:lstStyle>
-          <a:p>
-            <a:endParaRPr lang="pt-PT"/>
-          </a:p>
-        </p:txBody>
-      </p:sp>
-      <p:sp>
-        <p:nvSpPr>
-          <p:cNvPr id="4" name="Marcador de Posição do Texto 3">
-            <a:extLst>
-              <a:ext uri="{FF2B5EF4-FFF2-40B4-BE49-F238E27FC236}">
-                <a16:creationId xmlns:a16="http://schemas.microsoft.com/office/drawing/2014/main" id="{5AF738CA-F341-4D52-B5DC-8661CA961085}"/>
-              </a:ext>
-            </a:extLst>
-          </p:cNvPr>
-          <p:cNvSpPr>
-            <a:spLocks noGrp="1"/>
-          </p:cNvSpPr>
-          <p:nvPr>
-            <p:ph type="body" sz="half" idx="2"/>
-          </p:nvPr>
-        </p:nvSpPr>
-        <p:spPr>
-          <a:xfrm>
-            <a:off x="839788" y="2057400"/>
-            <a:ext cx="3932237" cy="3811588"/>
-          </a:xfrm>
-        </p:spPr>
-        <p:txBody>
-          <a:bodyPr/>
-          <a:lstStyle>
-            <a:lvl1pPr marL="0" indent="0">
-              <a:buNone/>
-              <a:defRPr sz="1600"/>
+            <a:lvl1pPr marL="0" indent="0" algn="ctr">
+              <a:buNone/>
+              <a:defRPr sz="1800"/>
             </a:lvl1pPr>
             <a:lvl2pPr marL="457200" indent="0">
               <a:buNone/>
@@ -2650,13 +2492,7 @@
       </p:sp>
       <p:sp>
         <p:nvSpPr>
-          <p:cNvPr id="5" name="Marcador de Posição da Data 4">
-            <a:extLst>
-              <a:ext uri="{FF2B5EF4-FFF2-40B4-BE49-F238E27FC236}">
-                <a16:creationId xmlns:a16="http://schemas.microsoft.com/office/drawing/2014/main" id="{447EF294-4B52-49E0-91B2-7A19718640E9}"/>
-              </a:ext>
-            </a:extLst>
-          </p:cNvPr>
+          <p:cNvPr id="5" name="Date Placeholder 4"/>
           <p:cNvSpPr>
             <a:spLocks noGrp="1"/>
           </p:cNvSpPr>
@@ -2664,14 +2500,23 @@
             <p:ph type="dt" sz="half" idx="10"/>
           </p:nvPr>
         </p:nvSpPr>
-        <p:spPr/>
+        <p:spPr>
+          <a:xfrm>
+            <a:off x="1447382" y="5469856"/>
+            <a:ext cx="5527351" cy="320123"/>
+          </a:xfrm>
+        </p:spPr>
         <p:txBody>
           <a:bodyPr/>
-          <a:lstStyle/>
+          <a:lstStyle>
+            <a:lvl1pPr algn="l">
+              <a:defRPr/>
+            </a:lvl1pPr>
+          </a:lstStyle>
           <a:p>
             <a:fld id="{C2437300-0444-4CE7-907B-B7E5D4BCB335}" type="datetimeFigureOut">
               <a:rPr lang="pt-PT" smtClean="0"/>
-              <a:t>22/04/2018</a:t>
+              <a:t>25/04/2018</a:t>
             </a:fld>
             <a:endParaRPr lang="pt-PT"/>
           </a:p>
@@ -2679,13 +2524,7 @@
       </p:sp>
       <p:sp>
         <p:nvSpPr>
-          <p:cNvPr id="6" name="Marcador de Posição do Rodapé 5">
-            <a:extLst>
-              <a:ext uri="{FF2B5EF4-FFF2-40B4-BE49-F238E27FC236}">
-                <a16:creationId xmlns:a16="http://schemas.microsoft.com/office/drawing/2014/main" id="{2C4878BF-AA76-467C-B56B-03384C269B47}"/>
-              </a:ext>
-            </a:extLst>
-          </p:cNvPr>
+          <p:cNvPr id="6" name="Footer Placeholder 5"/>
           <p:cNvSpPr>
             <a:spLocks noGrp="1"/>
           </p:cNvSpPr>
@@ -2693,7 +2532,12 @@
             <p:ph type="ftr" sz="quarter" idx="11"/>
           </p:nvPr>
         </p:nvSpPr>
-        <p:spPr/>
+        <p:spPr>
+          <a:xfrm>
+            <a:off x="1447382" y="318640"/>
+            <a:ext cx="5541004" cy="320931"/>
+          </a:xfrm>
+        </p:spPr>
         <p:txBody>
           <a:bodyPr/>
           <a:lstStyle/>
@@ -2704,13 +2548,7 @@
       </p:sp>
       <p:sp>
         <p:nvSpPr>
-          <p:cNvPr id="7" name="Marcador de Posição do Número do Diapositivo 6">
-            <a:extLst>
-              <a:ext uri="{FF2B5EF4-FFF2-40B4-BE49-F238E27FC236}">
-                <a16:creationId xmlns:a16="http://schemas.microsoft.com/office/drawing/2014/main" id="{FDAAE37E-F8B1-4B7B-A3BD-FC519E080962}"/>
-              </a:ext>
-            </a:extLst>
-          </p:cNvPr>
+          <p:cNvPr id="7" name="Slide Number Placeholder 6"/>
           <p:cNvSpPr>
             <a:spLocks noGrp="1"/>
           </p:cNvSpPr>
@@ -2734,7 +2572,7 @@
     </p:spTree>
     <p:extLst>
       <p:ext uri="{BB962C8B-B14F-4D97-AF65-F5344CB8AC3E}">
-        <p14:creationId xmlns:p14="http://schemas.microsoft.com/office/powerpoint/2010/main" val="3603555966"/>
+        <p14:creationId xmlns:p14="http://schemas.microsoft.com/office/powerpoint/2010/main" val="134906208"/>
       </p:ext>
     </p:extLst>
   </p:cSld>
@@ -2748,7 +2586,7 @@
 <p:sldMaster xmlns:a="http://schemas.openxmlformats.org/drawingml/2006/main" xmlns:r="http://schemas.openxmlformats.org/officeDocument/2006/relationships" xmlns:p="http://schemas.openxmlformats.org/presentationml/2006/main">
   <p:cSld>
     <p:bg>
-      <p:bgRef idx="1001">
+      <p:bgRef idx="1003">
         <a:schemeClr val="bg1"/>
       </p:bgRef>
     </p:bg>
@@ -2768,13 +2606,7 @@
       </p:grpSpPr>
       <p:sp>
         <p:nvSpPr>
-          <p:cNvPr id="2" name="Marcador de Posição do Título 1">
-            <a:extLst>
-              <a:ext uri="{FF2B5EF4-FFF2-40B4-BE49-F238E27FC236}">
-                <a16:creationId xmlns:a16="http://schemas.microsoft.com/office/drawing/2014/main" id="{A44C6B66-6228-4AB8-A935-9C6488F286FC}"/>
-              </a:ext>
-            </a:extLst>
-          </p:cNvPr>
+          <p:cNvPr id="2" name="Title Placeholder 1"/>
           <p:cNvSpPr>
             <a:spLocks noGrp="1"/>
           </p:cNvSpPr>
@@ -2784,8 +2616,8 @@
         </p:nvSpPr>
         <p:spPr>
           <a:xfrm>
-            <a:off x="838200" y="365125"/>
-            <a:ext cx="10515600" cy="1325563"/>
+            <a:off x="1451579" y="804519"/>
+            <a:ext cx="9291215" cy="1049235"/>
           </a:xfrm>
           <a:prstGeom prst="rect">
             <a:avLst/>
@@ -2801,18 +2633,13 @@
               <a:rPr lang="pt-PT"/>
               <a:t>Clique para editar o estilo de título do Modelo Global</a:t>
             </a:r>
-          </a:p>
-        </p:txBody>
-      </p:sp>
-      <p:sp>
-        <p:nvSpPr>
-          <p:cNvPr id="3" name="Marcador de Posição do Texto 2">
-            <a:extLst>
-              <a:ext uri="{FF2B5EF4-FFF2-40B4-BE49-F238E27FC236}">
-                <a16:creationId xmlns:a16="http://schemas.microsoft.com/office/drawing/2014/main" id="{57285DDD-A17F-44DC-93B9-EC19A8D71F61}"/>
-              </a:ext>
-            </a:extLst>
-          </p:cNvPr>
+            <a:endParaRPr lang="en-US" dirty="0"/>
+          </a:p>
+        </p:txBody>
+      </p:sp>
+      <p:sp>
+        <p:nvSpPr>
+          <p:cNvPr id="3" name="Text Placeholder 2"/>
           <p:cNvSpPr>
             <a:spLocks noGrp="1"/>
           </p:cNvSpPr>
@@ -2822,8 +2649,8 @@
         </p:nvSpPr>
         <p:spPr>
           <a:xfrm>
-            <a:off x="838200" y="1825625"/>
-            <a:ext cx="10515600" cy="4351338"/>
+            <a:off x="1451579" y="2015732"/>
+            <a:ext cx="9291215" cy="3450613"/>
           </a:xfrm>
           <a:prstGeom prst="rect">
             <a:avLst/>
@@ -2837,49 +2664,43 @@
           <a:p>
             <a:pPr lvl="0"/>
             <a:r>
-              <a:rPr lang="pt-PT"/>
-              <a:t>Editar os estilos de texto do Modelo Global</a:t>
+              <a:rPr lang="en-US" dirty="0"/>
+              <a:t>Edit Master text styles</a:t>
             </a:r>
           </a:p>
           <a:p>
             <a:pPr lvl="1"/>
             <a:r>
-              <a:rPr lang="pt-PT"/>
-              <a:t>Segundo nível</a:t>
+              <a:rPr lang="en-US" dirty="0"/>
+              <a:t>Second level</a:t>
             </a:r>
           </a:p>
           <a:p>
             <a:pPr lvl="2"/>
             <a:r>
-              <a:rPr lang="pt-PT"/>
-              <a:t>Terceiro nível</a:t>
+              <a:rPr lang="en-US" dirty="0"/>
+              <a:t>Third level</a:t>
             </a:r>
           </a:p>
           <a:p>
             <a:pPr lvl="3"/>
             <a:r>
-              <a:rPr lang="pt-PT"/>
-              <a:t>Quarto nível</a:t>
+              <a:rPr lang="en-US" dirty="0"/>
+              <a:t>Fourth level</a:t>
             </a:r>
           </a:p>
           <a:p>
             <a:pPr lvl="4"/>
             <a:r>
-              <a:rPr lang="pt-PT"/>
-              <a:t>Quinto nível</a:t>
-            </a:r>
-          </a:p>
-        </p:txBody>
-      </p:sp>
-      <p:sp>
-        <p:nvSpPr>
-          <p:cNvPr id="4" name="Marcador de Posição da Data 3">
-            <a:extLst>
-              <a:ext uri="{FF2B5EF4-FFF2-40B4-BE49-F238E27FC236}">
-                <a16:creationId xmlns:a16="http://schemas.microsoft.com/office/drawing/2014/main" id="{12DD2B8A-2C95-4857-9BAB-BBBF5D3753EB}"/>
-              </a:ext>
-            </a:extLst>
-          </p:cNvPr>
+              <a:rPr lang="en-US" dirty="0"/>
+              <a:t>Fifth level</a:t>
+            </a:r>
+          </a:p>
+        </p:txBody>
+      </p:sp>
+      <p:sp>
+        <p:nvSpPr>
+          <p:cNvPr id="4" name="Date Placeholder 3"/>
           <p:cNvSpPr>
             <a:spLocks noGrp="1"/>
           </p:cNvSpPr>
@@ -2889,8 +2710,8 @@
         </p:nvSpPr>
         <p:spPr>
           <a:xfrm>
-            <a:off x="838200" y="6356350"/>
-            <a:ext cx="2743200" cy="365125"/>
+            <a:off x="7242079" y="330370"/>
+            <a:ext cx="3500715" cy="309201"/>
           </a:xfrm>
           <a:prstGeom prst="rect">
             <a:avLst/>
@@ -2899,8 +2720,8 @@
         <p:txBody>
           <a:bodyPr vert="horz" lIns="91440" tIns="45720" rIns="91440" bIns="45720" rtlCol="0" anchor="ctr"/>
           <a:lstStyle>
-            <a:lvl1pPr algn="l">
-              <a:defRPr sz="1200">
+            <a:lvl1pPr algn="r">
+              <a:defRPr sz="1000">
                 <a:solidFill>
                   <a:schemeClr val="tx1">
                     <a:tint val="75000"/>
@@ -2912,7 +2733,7 @@
           <a:p>
             <a:fld id="{C2437300-0444-4CE7-907B-B7E5D4BCB335}" type="datetimeFigureOut">
               <a:rPr lang="pt-PT" smtClean="0"/>
-              <a:t>22/04/2018</a:t>
+              <a:t>25/04/2018</a:t>
             </a:fld>
             <a:endParaRPr lang="pt-PT"/>
           </a:p>
@@ -2920,13 +2741,7 @@
       </p:sp>
       <p:sp>
         <p:nvSpPr>
-          <p:cNvPr id="5" name="Marcador de Posição do Rodapé 4">
-            <a:extLst>
-              <a:ext uri="{FF2B5EF4-FFF2-40B4-BE49-F238E27FC236}">
-                <a16:creationId xmlns:a16="http://schemas.microsoft.com/office/drawing/2014/main" id="{E0D7251D-E333-4ACC-B307-7D94DAFD046A}"/>
-              </a:ext>
-            </a:extLst>
-          </p:cNvPr>
+          <p:cNvPr id="5" name="Footer Placeholder 4"/>
           <p:cNvSpPr>
             <a:spLocks noGrp="1"/>
           </p:cNvSpPr>
@@ -2936,8 +2751,8 @@
         </p:nvSpPr>
         <p:spPr>
           <a:xfrm>
-            <a:off x="4038600" y="6356350"/>
-            <a:ext cx="4114800" cy="365125"/>
+            <a:off x="1451579" y="329307"/>
+            <a:ext cx="5626774" cy="309201"/>
           </a:xfrm>
           <a:prstGeom prst="rect">
             <a:avLst/>
@@ -2946,8 +2761,8 @@
         <p:txBody>
           <a:bodyPr vert="horz" lIns="91440" tIns="45720" rIns="91440" bIns="45720" rtlCol="0" anchor="ctr"/>
           <a:lstStyle>
-            <a:lvl1pPr algn="ctr">
-              <a:defRPr sz="1200">
+            <a:lvl1pPr algn="l">
+              <a:defRPr sz="1000">
                 <a:solidFill>
                   <a:schemeClr val="tx1">
                     <a:tint val="75000"/>
@@ -2963,13 +2778,7 @@
       </p:sp>
       <p:sp>
         <p:nvSpPr>
-          <p:cNvPr id="6" name="Marcador de Posição do Número do Diapositivo 5">
-            <a:extLst>
-              <a:ext uri="{FF2B5EF4-FFF2-40B4-BE49-F238E27FC236}">
-                <a16:creationId xmlns:a16="http://schemas.microsoft.com/office/drawing/2014/main" id="{A97F1791-4663-45A8-9F14-42810400DBAE}"/>
-              </a:ext>
-            </a:extLst>
-          </p:cNvPr>
+          <p:cNvPr id="6" name="Slide Number Placeholder 5"/>
           <p:cNvSpPr>
             <a:spLocks noGrp="1"/>
           </p:cNvSpPr>
@@ -2979,22 +2788,20 @@
         </p:nvSpPr>
         <p:spPr>
           <a:xfrm>
-            <a:off x="8610600" y="6356350"/>
-            <a:ext cx="2743200" cy="365125"/>
+            <a:off x="480060" y="798973"/>
+            <a:ext cx="811019" cy="503578"/>
           </a:xfrm>
           <a:prstGeom prst="rect">
             <a:avLst/>
           </a:prstGeom>
         </p:spPr>
         <p:txBody>
-          <a:bodyPr vert="horz" lIns="91440" tIns="45720" rIns="91440" bIns="45720" rtlCol="0" anchor="ctr"/>
+          <a:bodyPr vert="horz" lIns="91440" tIns="45720" rIns="91440" bIns="45720" rtlCol="0" anchor="t"/>
           <a:lstStyle>
             <a:lvl1pPr algn="r">
-              <a:defRPr sz="1200">
+              <a:defRPr sz="2800">
                 <a:solidFill>
-                  <a:schemeClr val="tx1">
-                    <a:tint val="75000"/>
-                  </a:schemeClr>
+                  <a:schemeClr val="accent1"/>
                 </a:solidFill>
               </a:defRPr>
             </a:lvl1pPr>
@@ -3008,30 +2815,147 @@
           </a:p>
         </p:txBody>
       </p:sp>
+      <p:sp>
+        <p:nvSpPr>
+          <p:cNvPr id="9" name="Rectangle 8"/>
+          <p:cNvSpPr/>
+          <p:nvPr/>
+        </p:nvSpPr>
+        <p:spPr>
+          <a:xfrm>
+            <a:off x="0" y="3622291"/>
+            <a:ext cx="12192000" cy="2505984"/>
+          </a:xfrm>
+          <a:prstGeom prst="rect">
+            <a:avLst/>
+          </a:prstGeom>
+          <a:gradFill flip="none" rotWithShape="1">
+            <a:gsLst>
+              <a:gs pos="0">
+                <a:schemeClr val="bg2">
+                  <a:alpha val="0"/>
+                </a:schemeClr>
+              </a:gs>
+              <a:gs pos="100000">
+                <a:schemeClr val="bg2">
+                  <a:alpha val="80000"/>
+                </a:schemeClr>
+              </a:gs>
+            </a:gsLst>
+            <a:lin ang="5400000" scaled="0"/>
+            <a:tileRect/>
+          </a:gradFill>
+          <a:ln>
+            <a:noFill/>
+          </a:ln>
+        </p:spPr>
+        <p:style>
+          <a:lnRef idx="2">
+            <a:schemeClr val="accent1">
+              <a:shade val="50000"/>
+            </a:schemeClr>
+          </a:lnRef>
+          <a:fillRef idx="1">
+            <a:schemeClr val="accent1"/>
+          </a:fillRef>
+          <a:effectRef idx="0">
+            <a:schemeClr val="accent1"/>
+          </a:effectRef>
+          <a:fontRef idx="minor">
+            <a:schemeClr val="lt1"/>
+          </a:fontRef>
+        </p:style>
+      </p:sp>
+      <p:pic>
+        <p:nvPicPr>
+          <p:cNvPr id="10" name="Picture 9"/>
+          <p:cNvPicPr>
+            <a:picLocks noChangeAspect="1"/>
+          </p:cNvPicPr>
+          <p:nvPr/>
+        </p:nvPicPr>
+        <p:blipFill rotWithShape="1">
+          <a:blip r:embed="rId13">
+            <a:extLst>
+              <a:ext uri="{28A0092B-C50C-407E-A947-70E740481C1C}">
+                <a14:useLocalDpi xmlns:a14="http://schemas.microsoft.com/office/drawing/2010/main" val="0"/>
+              </a:ext>
+            </a:extLst>
+          </a:blip>
+          <a:srcRect t="1538" b="-1538"/>
+          <a:stretch/>
+        </p:blipFill>
+        <p:spPr>
+          <a:xfrm>
+            <a:off x="0" y="6129338"/>
+            <a:ext cx="12192000" cy="742950"/>
+          </a:xfrm>
+          <a:prstGeom prst="rect">
+            <a:avLst/>
+          </a:prstGeom>
+        </p:spPr>
+      </p:pic>
+      <p:cxnSp>
+        <p:nvCxnSpPr>
+          <p:cNvPr id="12" name="Straight Connector 11"/>
+          <p:cNvCxnSpPr/>
+          <p:nvPr/>
+        </p:nvCxnSpPr>
+        <p:spPr>
+          <a:xfrm>
+            <a:off x="0" y="6138142"/>
+            <a:ext cx="12192000" cy="0"/>
+          </a:xfrm>
+          <a:prstGeom prst="line">
+            <a:avLst/>
+          </a:prstGeom>
+          <a:ln w="12700">
+            <a:solidFill>
+              <a:srgbClr val="000001">
+                <a:alpha val="20000"/>
+              </a:srgbClr>
+            </a:solidFill>
+          </a:ln>
+        </p:spPr>
+        <p:style>
+          <a:lnRef idx="1">
+            <a:schemeClr val="accent1"/>
+          </a:lnRef>
+          <a:fillRef idx="0">
+            <a:schemeClr val="accent1"/>
+          </a:fillRef>
+          <a:effectRef idx="0">
+            <a:schemeClr val="accent1"/>
+          </a:effectRef>
+          <a:fontRef idx="minor">
+            <a:schemeClr val="tx1"/>
+          </a:fontRef>
+        </p:style>
+      </p:cxnSp>
     </p:spTree>
     <p:extLst>
       <p:ext uri="{BB962C8B-B14F-4D97-AF65-F5344CB8AC3E}">
-        <p14:creationId xmlns:p14="http://schemas.microsoft.com/office/powerpoint/2010/main" val="1969802549"/>
+        <p14:creationId xmlns:p14="http://schemas.microsoft.com/office/powerpoint/2010/main" val="2208572649"/>
       </p:ext>
     </p:extLst>
   </p:cSld>
-  <p:clrMap bg1="lt1" tx1="dk1" bg2="lt2" tx2="dk2" accent1="accent1" accent2="accent2" accent3="accent3" accent4="accent4" accent5="accent5" accent6="accent6" hlink="hlink" folHlink="folHlink"/>
+  <p:clrMap bg1="dk1" tx1="lt1" bg2="dk2" tx2="lt2" accent1="accent1" accent2="accent2" accent3="accent3" accent4="accent4" accent5="accent5" accent6="accent6" hlink="hlink" folHlink="folHlink"/>
   <p:sldLayoutIdLst>
-    <p:sldLayoutId id="2147483649" r:id="rId1"/>
-    <p:sldLayoutId id="2147483650" r:id="rId2"/>
-    <p:sldLayoutId id="2147483651" r:id="rId3"/>
-    <p:sldLayoutId id="2147483652" r:id="rId4"/>
-    <p:sldLayoutId id="2147483653" r:id="rId5"/>
-    <p:sldLayoutId id="2147483654" r:id="rId6"/>
-    <p:sldLayoutId id="2147483655" r:id="rId7"/>
-    <p:sldLayoutId id="2147483656" r:id="rId8"/>
-    <p:sldLayoutId id="2147483657" r:id="rId9"/>
-    <p:sldLayoutId id="2147483658" r:id="rId10"/>
-    <p:sldLayoutId id="2147483659" r:id="rId11"/>
+    <p:sldLayoutId id="2147483697" r:id="rId1"/>
+    <p:sldLayoutId id="2147483698" r:id="rId2"/>
+    <p:sldLayoutId id="2147483699" r:id="rId3"/>
+    <p:sldLayoutId id="2147483700" r:id="rId4"/>
+    <p:sldLayoutId id="2147483701" r:id="rId5"/>
+    <p:sldLayoutId id="2147483702" r:id="rId6"/>
+    <p:sldLayoutId id="2147483703" r:id="rId7"/>
+    <p:sldLayoutId id="2147483704" r:id="rId8"/>
+    <p:sldLayoutId id="2147483705" r:id="rId9"/>
+    <p:sldLayoutId id="2147483706" r:id="rId10"/>
+    <p:sldLayoutId id="2147483707" r:id="rId11"/>
   </p:sldLayoutIdLst>
   <p:txStyles>
     <p:titleStyle>
-      <a:lvl1pPr algn="l" defTabSz="914400" rtl="0" eaLnBrk="1" latinLnBrk="0" hangingPunct="1">
+      <a:lvl1pPr algn="ctr" defTabSz="914400" rtl="0" eaLnBrk="1" latinLnBrk="0" hangingPunct="1">
         <a:lnSpc>
           <a:spcPct val="90000"/>
         </a:lnSpc>
@@ -3039,10 +2963,11 @@
           <a:spcPct val="0"/>
         </a:spcBef>
         <a:buNone/>
-        <a:defRPr sz="4400" kern="1200">
+        <a:defRPr sz="3200" b="0" i="0" kern="1200" cap="all">
           <a:solidFill>
-            <a:schemeClr val="tx1"/>
+            <a:schemeClr val="accent1"/>
           </a:solidFill>
+          <a:effectLst/>
           <a:latin typeface="+mj-lt"/>
           <a:ea typeface="+mj-ea"/>
           <a:cs typeface="+mj-cs"/>
@@ -3052,17 +2977,22 @@
     <p:bodyStyle>
       <a:lvl1pPr marL="228600" indent="-228600" algn="l" defTabSz="914400" rtl="0" eaLnBrk="1" latinLnBrk="0" hangingPunct="1">
         <a:lnSpc>
-          <a:spcPct val="90000"/>
+          <a:spcPct val="120000"/>
         </a:lnSpc>
         <a:spcBef>
           <a:spcPts val="1000"/>
         </a:spcBef>
+        <a:buClr>
+          <a:schemeClr val="accent1"/>
+        </a:buClr>
+        <a:buSzPct val="100000"/>
         <a:buFont typeface="Arial" panose="020B0604020202020204" pitchFamily="34" charset="0"/>
         <a:buChar char="•"/>
-        <a:defRPr sz="2800" kern="1200">
+        <a:defRPr sz="2000" kern="1200">
           <a:solidFill>
             <a:schemeClr val="tx1"/>
           </a:solidFill>
+          <a:effectLst/>
           <a:latin typeface="+mn-lt"/>
           <a:ea typeface="+mn-ea"/>
           <a:cs typeface="+mn-cs"/>
@@ -3070,17 +3000,22 @@
       </a:lvl1pPr>
       <a:lvl2pPr marL="685800" indent="-228600" algn="l" defTabSz="914400" rtl="0" eaLnBrk="1" latinLnBrk="0" hangingPunct="1">
         <a:lnSpc>
-          <a:spcPct val="90000"/>
+          <a:spcPct val="120000"/>
         </a:lnSpc>
         <a:spcBef>
           <a:spcPts val="500"/>
         </a:spcBef>
+        <a:buClr>
+          <a:schemeClr val="accent1"/>
+        </a:buClr>
+        <a:buSzPct val="100000"/>
         <a:buFont typeface="Arial" panose="020B0604020202020204" pitchFamily="34" charset="0"/>
         <a:buChar char="•"/>
-        <a:defRPr sz="2400" kern="1200">
+        <a:defRPr sz="1800" kern="1200" cap="none" baseline="0">
           <a:solidFill>
             <a:schemeClr val="tx1"/>
           </a:solidFill>
+          <a:effectLst/>
           <a:latin typeface="+mn-lt"/>
           <a:ea typeface="+mn-ea"/>
           <a:cs typeface="+mn-cs"/>
@@ -3088,17 +3023,22 @@
       </a:lvl2pPr>
       <a:lvl3pPr marL="1143000" indent="-228600" algn="l" defTabSz="914400" rtl="0" eaLnBrk="1" latinLnBrk="0" hangingPunct="1">
         <a:lnSpc>
-          <a:spcPct val="90000"/>
+          <a:spcPct val="120000"/>
         </a:lnSpc>
         <a:spcBef>
           <a:spcPts val="500"/>
         </a:spcBef>
+        <a:buClr>
+          <a:schemeClr val="accent1"/>
+        </a:buClr>
+        <a:buSzPct val="100000"/>
         <a:buFont typeface="Arial" panose="020B0604020202020204" pitchFamily="34" charset="0"/>
         <a:buChar char="•"/>
-        <a:defRPr sz="2000" kern="1200">
+        <a:defRPr sz="1600" kern="1200">
           <a:solidFill>
             <a:schemeClr val="tx1"/>
           </a:solidFill>
+          <a:effectLst/>
           <a:latin typeface="+mn-lt"/>
           <a:ea typeface="+mn-ea"/>
           <a:cs typeface="+mn-cs"/>
@@ -3106,17 +3046,22 @@
       </a:lvl3pPr>
       <a:lvl4pPr marL="1600200" indent="-228600" algn="l" defTabSz="914400" rtl="0" eaLnBrk="1" latinLnBrk="0" hangingPunct="1">
         <a:lnSpc>
-          <a:spcPct val="90000"/>
+          <a:spcPct val="120000"/>
         </a:lnSpc>
         <a:spcBef>
           <a:spcPts val="500"/>
         </a:spcBef>
+        <a:buClr>
+          <a:schemeClr val="accent1"/>
+        </a:buClr>
+        <a:buSzPct val="100000"/>
         <a:buFont typeface="Arial" panose="020B0604020202020204" pitchFamily="34" charset="0"/>
         <a:buChar char="•"/>
-        <a:defRPr sz="1800" kern="1200">
+        <a:defRPr sz="1400" kern="1200" cap="none" baseline="0">
           <a:solidFill>
             <a:schemeClr val="tx1"/>
           </a:solidFill>
+          <a:effectLst/>
           <a:latin typeface="+mn-lt"/>
           <a:ea typeface="+mn-ea"/>
           <a:cs typeface="+mn-cs"/>
@@ -3124,17 +3069,22 @@
       </a:lvl4pPr>
       <a:lvl5pPr marL="2057400" indent="-228600" algn="l" defTabSz="914400" rtl="0" eaLnBrk="1" latinLnBrk="0" hangingPunct="1">
         <a:lnSpc>
-          <a:spcPct val="90000"/>
+          <a:spcPct val="120000"/>
         </a:lnSpc>
         <a:spcBef>
           <a:spcPts val="500"/>
         </a:spcBef>
+        <a:buClr>
+          <a:schemeClr val="accent1"/>
+        </a:buClr>
+        <a:buSzPct val="100000"/>
         <a:buFont typeface="Arial" panose="020B0604020202020204" pitchFamily="34" charset="0"/>
         <a:buChar char="•"/>
-        <a:defRPr sz="1800" kern="1200">
+        <a:defRPr sz="1200" kern="1200">
           <a:solidFill>
             <a:schemeClr val="tx1"/>
           </a:solidFill>
+          <a:effectLst/>
           <a:latin typeface="+mn-lt"/>
           <a:ea typeface="+mn-ea"/>
           <a:cs typeface="+mn-cs"/>
@@ -3142,17 +3092,22 @@
       </a:lvl5pPr>
       <a:lvl6pPr marL="2514600" indent="-228600" algn="l" defTabSz="914400" rtl="0" eaLnBrk="1" latinLnBrk="0" hangingPunct="1">
         <a:lnSpc>
-          <a:spcPct val="90000"/>
+          <a:spcPct val="120000"/>
         </a:lnSpc>
         <a:spcBef>
           <a:spcPts val="500"/>
         </a:spcBef>
+        <a:buClr>
+          <a:schemeClr val="accent1"/>
+        </a:buClr>
+        <a:buSzPct val="100000"/>
         <a:buFont typeface="Arial" panose="020B0604020202020204" pitchFamily="34" charset="0"/>
         <a:buChar char="•"/>
-        <a:defRPr sz="1800" kern="1200">
+        <a:defRPr sz="1200" kern="1200">
           <a:solidFill>
             <a:schemeClr val="tx1"/>
           </a:solidFill>
+          <a:effectLst/>
           <a:latin typeface="+mn-lt"/>
           <a:ea typeface="+mn-ea"/>
           <a:cs typeface="+mn-cs"/>
@@ -3160,17 +3115,22 @@
       </a:lvl6pPr>
       <a:lvl7pPr marL="2971800" indent="-228600" algn="l" defTabSz="914400" rtl="0" eaLnBrk="1" latinLnBrk="0" hangingPunct="1">
         <a:lnSpc>
-          <a:spcPct val="90000"/>
+          <a:spcPct val="120000"/>
         </a:lnSpc>
         <a:spcBef>
           <a:spcPts val="500"/>
         </a:spcBef>
+        <a:buClr>
+          <a:schemeClr val="accent1"/>
+        </a:buClr>
+        <a:buSzPct val="100000"/>
         <a:buFont typeface="Arial" panose="020B0604020202020204" pitchFamily="34" charset="0"/>
         <a:buChar char="•"/>
-        <a:defRPr sz="1800" kern="1200">
+        <a:defRPr sz="1200" kern="1200">
           <a:solidFill>
             <a:schemeClr val="tx1"/>
           </a:solidFill>
+          <a:effectLst/>
           <a:latin typeface="+mn-lt"/>
           <a:ea typeface="+mn-ea"/>
           <a:cs typeface="+mn-cs"/>
@@ -3178,17 +3138,22 @@
       </a:lvl7pPr>
       <a:lvl8pPr marL="3429000" indent="-228600" algn="l" defTabSz="914400" rtl="0" eaLnBrk="1" latinLnBrk="0" hangingPunct="1">
         <a:lnSpc>
-          <a:spcPct val="90000"/>
+          <a:spcPct val="120000"/>
         </a:lnSpc>
         <a:spcBef>
           <a:spcPts val="500"/>
         </a:spcBef>
+        <a:buClr>
+          <a:schemeClr val="accent1"/>
+        </a:buClr>
+        <a:buSzPct val="100000"/>
         <a:buFont typeface="Arial" panose="020B0604020202020204" pitchFamily="34" charset="0"/>
         <a:buChar char="•"/>
-        <a:defRPr sz="1800" kern="1200">
+        <a:defRPr sz="1200" kern="1200" baseline="0">
           <a:solidFill>
             <a:schemeClr val="tx1"/>
           </a:solidFill>
+          <a:effectLst/>
           <a:latin typeface="+mn-lt"/>
           <a:ea typeface="+mn-ea"/>
           <a:cs typeface="+mn-cs"/>
@@ -3196,17 +3161,22 @@
       </a:lvl8pPr>
       <a:lvl9pPr marL="3886200" indent="-228600" algn="l" defTabSz="914400" rtl="0" eaLnBrk="1" latinLnBrk="0" hangingPunct="1">
         <a:lnSpc>
-          <a:spcPct val="90000"/>
+          <a:spcPct val="120000"/>
         </a:lnSpc>
         <a:spcBef>
           <a:spcPts val="500"/>
         </a:spcBef>
+        <a:buClr>
+          <a:schemeClr val="accent1"/>
+        </a:buClr>
+        <a:buSzPct val="100000"/>
         <a:buFont typeface="Arial" panose="020B0604020202020204" pitchFamily="34" charset="0"/>
         <a:buChar char="•"/>
-        <a:defRPr sz="1800" kern="1200">
+        <a:defRPr sz="1200" kern="1200" baseline="0">
           <a:solidFill>
             <a:schemeClr val="tx1"/>
           </a:solidFill>
+          <a:effectLst/>
           <a:latin typeface="+mn-lt"/>
           <a:ea typeface="+mn-ea"/>
           <a:cs typeface="+mn-cs"/>
@@ -3215,7 +3185,7 @@
     </p:bodyStyle>
     <p:otherStyle>
       <a:defPPr>
-        <a:defRPr lang="pt-PT"/>
+        <a:defRPr lang="en-US"/>
       </a:defPPr>
       <a:lvl1pPr marL="0" algn="l" defTabSz="914400" rtl="0" eaLnBrk="1" latinLnBrk="0" hangingPunct="1">
         <a:defRPr sz="1800" kern="1200">
@@ -3315,14 +3285,6 @@
 <file path=ppt/slides/slide1.xml><?xml version="1.0" encoding="utf-8"?>
 <p:sld xmlns:a="http://schemas.openxmlformats.org/drawingml/2006/main" xmlns:r="http://schemas.openxmlformats.org/officeDocument/2006/relationships" xmlns:p="http://schemas.openxmlformats.org/presentationml/2006/main">
   <p:cSld>
-    <p:bg>
-      <p:bgPr>
-        <a:solidFill>
-          <a:srgbClr val="C00000"/>
-        </a:solidFill>
-        <a:effectLst/>
-      </p:bgPr>
-    </p:bg>
     <p:spTree>
       <p:nvGrpSpPr>
         <p:cNvPr id="1" name=""/>
@@ -3355,20 +3317,22 @@
         </p:nvSpPr>
         <p:spPr>
           <a:xfrm>
-            <a:off x="1358537" y="1728316"/>
-            <a:ext cx="9309463" cy="967730"/>
+            <a:off x="340180" y="1596681"/>
+            <a:ext cx="9309463" cy="1612264"/>
           </a:xfrm>
         </p:spPr>
         <p:txBody>
-          <a:bodyPr/>
-          <a:lstStyle/>
-          <a:p>
+          <a:bodyPr>
+            <a:normAutofit fontScale="90000"/>
+          </a:bodyPr>
+          <a:lstStyle/>
+          <a:p>
+            <a:pPr algn="l"/>
             <a:r>
               <a:rPr lang="pt-PT" dirty="0">
                 <a:solidFill>
-                  <a:schemeClr val="bg1"/>
+                  <a:schemeClr val="tx1"/>
                 </a:solidFill>
-                <a:latin typeface="Arial" panose="020B0604020202020204" pitchFamily="34" charset="0"/>
                 <a:cs typeface="Arial" panose="020B0604020202020204" pitchFamily="34" charset="0"/>
               </a:rPr>
               <a:t>Segurança da informação</a:t>
@@ -3378,10 +3342,10 @@
       </p:sp>
       <p:sp>
         <p:nvSpPr>
-          <p:cNvPr id="3" name="Subtítulo 2">
+          <p:cNvPr id="10" name="Subtítulo 2">
             <a:extLst>
               <a:ext uri="{FF2B5EF4-FFF2-40B4-BE49-F238E27FC236}">
-                <a16:creationId xmlns:a16="http://schemas.microsoft.com/office/drawing/2014/main" id="{B3682955-D774-48D4-9EC2-D84C34AE1F66}"/>
+                <a16:creationId xmlns:a16="http://schemas.microsoft.com/office/drawing/2014/main" id="{2FEBC7E0-8526-4F49-B421-4E8F84DDC631}"/>
               </a:ext>
             </a:extLst>
           </p:cNvPr>
@@ -3394,21 +3358,31 @@
         </p:nvSpPr>
         <p:spPr>
           <a:xfrm>
-            <a:off x="8852597" y="5838092"/>
-            <a:ext cx="2855741" cy="752789"/>
+            <a:off x="340180" y="3518185"/>
+            <a:ext cx="7543800" cy="857250"/>
           </a:xfrm>
         </p:spPr>
         <p:txBody>
-          <a:bodyPr/>
-          <a:lstStyle/>
-          <a:p>
-            <a:r>
-              <a:rPr lang="pt-PT" dirty="0">
-                <a:solidFill>
-                  <a:schemeClr val="bg1"/>
-                </a:solidFill>
+          <a:bodyPr>
+            <a:normAutofit/>
+          </a:bodyPr>
+          <a:lstStyle/>
+          <a:p>
+            <a:pPr algn="l"/>
+            <a:r>
+              <a:rPr lang="pt-PT" sz="1400" dirty="0">
+                <a:cs typeface="Arial" panose="020B0604020202020204" pitchFamily="34" charset="0"/>
               </a:rPr>
-              <a:t>Nuno Veloso, 42181.</a:t>
+              <a:t>Projeto e Seminário</a:t>
+            </a:r>
+          </a:p>
+          <a:p>
+            <a:pPr algn="l"/>
+            <a:r>
+              <a:rPr lang="pt-PT" sz="1400" dirty="0">
+                <a:cs typeface="Arial" panose="020B0604020202020204" pitchFamily="34" charset="0"/>
+              </a:rPr>
+              <a:t>Semestre de Verão 2017/2018</a:t>
             </a:r>
           </a:p>
           <a:p>
@@ -3418,10 +3392,10 @@
       </p:sp>
       <p:pic>
         <p:nvPicPr>
-          <p:cNvPr id="7" name="Imagem 6">
+          <p:cNvPr id="11" name="Imagem 10">
             <a:extLst>
               <a:ext uri="{FF2B5EF4-FFF2-40B4-BE49-F238E27FC236}">
-                <a16:creationId xmlns:a16="http://schemas.microsoft.com/office/drawing/2014/main" id="{5EBD45DA-E66D-4D5F-AC0E-B7C158640253}"/>
+                <a16:creationId xmlns:a16="http://schemas.microsoft.com/office/drawing/2014/main" id="{56F35A96-4962-4BD7-B1A5-226215768359}"/>
               </a:ext>
             </a:extLst>
           </p:cNvPr>
@@ -3444,42 +3418,6 @@
         </p:blipFill>
         <p:spPr>
           <a:xfrm>
-            <a:off x="3806425" y="3054699"/>
-            <a:ext cx="4248224" cy="2071339"/>
-          </a:xfrm>
-          <a:prstGeom prst="rect">
-            <a:avLst/>
-          </a:prstGeom>
-        </p:spPr>
-      </p:pic>
-      <p:pic>
-        <p:nvPicPr>
-          <p:cNvPr id="11" name="Imagem 10">
-            <a:extLst>
-              <a:ext uri="{FF2B5EF4-FFF2-40B4-BE49-F238E27FC236}">
-                <a16:creationId xmlns:a16="http://schemas.microsoft.com/office/drawing/2014/main" id="{56F35A96-4962-4BD7-B1A5-226215768359}"/>
-              </a:ext>
-            </a:extLst>
-          </p:cNvPr>
-          <p:cNvPicPr>
-            <a:picLocks noChangeAspect="1"/>
-          </p:cNvPicPr>
-          <p:nvPr/>
-        </p:nvPicPr>
-        <p:blipFill>
-          <a:blip r:embed="rId3">
-            <a:extLst>
-              <a:ext uri="{28A0092B-C50C-407E-A947-70E740481C1C}">
-                <a14:useLocalDpi xmlns:a14="http://schemas.microsoft.com/office/drawing/2010/main" val="0"/>
-              </a:ext>
-            </a:extLst>
-          </a:blip>
-          <a:stretch>
-            <a:fillRect/>
-          </a:stretch>
-        </p:blipFill>
-        <p:spPr>
-          <a:xfrm>
             <a:off x="-108083" y="-15583"/>
             <a:ext cx="2281440" cy="1612264"/>
           </a:xfrm>
@@ -3488,6 +3426,155 @@
           </a:prstGeom>
         </p:spPr>
       </p:pic>
+      <p:sp>
+        <p:nvSpPr>
+          <p:cNvPr id="4" name="CaixaDeTexto 3">
+            <a:extLst>
+              <a:ext uri="{FF2B5EF4-FFF2-40B4-BE49-F238E27FC236}">
+                <a16:creationId xmlns:a16="http://schemas.microsoft.com/office/drawing/2014/main" id="{7029C821-E5BF-4F84-AF45-156D950C1254}"/>
+              </a:ext>
+            </a:extLst>
+          </p:cNvPr>
+          <p:cNvSpPr txBox="1"/>
+          <p:nvPr/>
+        </p:nvSpPr>
+        <p:spPr>
+          <a:xfrm>
+            <a:off x="83105" y="6296939"/>
+            <a:ext cx="4479624" cy="369332"/>
+          </a:xfrm>
+          <a:prstGeom prst="rect">
+            <a:avLst/>
+          </a:prstGeom>
+          <a:noFill/>
+        </p:spPr>
+        <p:txBody>
+          <a:bodyPr wrap="none" rtlCol="0">
+            <a:spAutoFit/>
+          </a:bodyPr>
+          <a:lstStyle/>
+          <a:p>
+            <a:r>
+              <a:rPr lang="pt-PT" dirty="0"/>
+              <a:t>Orientadores: Nuno </a:t>
+            </a:r>
+            <a:r>
+              <a:rPr lang="pt-PT" dirty="0" err="1"/>
+              <a:t>Datia</a:t>
+            </a:r>
+            <a:r>
+              <a:rPr lang="pt-PT" dirty="0"/>
+              <a:t>  | Matilde Pato</a:t>
+            </a:r>
+          </a:p>
+        </p:txBody>
+      </p:sp>
+      <p:sp>
+        <p:nvSpPr>
+          <p:cNvPr id="5" name="CaixaDeTexto 4">
+            <a:extLst>
+              <a:ext uri="{FF2B5EF4-FFF2-40B4-BE49-F238E27FC236}">
+                <a16:creationId xmlns:a16="http://schemas.microsoft.com/office/drawing/2014/main" id="{B455A6DD-EA48-41E0-B69D-6A51C4127E7C}"/>
+              </a:ext>
+            </a:extLst>
+          </p:cNvPr>
+          <p:cNvSpPr txBox="1"/>
+          <p:nvPr/>
+        </p:nvSpPr>
+        <p:spPr>
+          <a:xfrm>
+            <a:off x="4994912" y="6296939"/>
+            <a:ext cx="2193421" cy="369332"/>
+          </a:xfrm>
+          <a:prstGeom prst="rect">
+            <a:avLst/>
+          </a:prstGeom>
+          <a:noFill/>
+        </p:spPr>
+        <p:txBody>
+          <a:bodyPr wrap="none" rtlCol="0">
+            <a:spAutoFit/>
+          </a:bodyPr>
+          <a:lstStyle/>
+          <a:p>
+            <a:r>
+              <a:rPr lang="pt-PT" dirty="0"/>
+              <a:t>Autor: Nuno Veloso</a:t>
+            </a:r>
+          </a:p>
+        </p:txBody>
+      </p:sp>
+      <p:sp>
+        <p:nvSpPr>
+          <p:cNvPr id="6" name="CaixaDeTexto 5">
+            <a:extLst>
+              <a:ext uri="{FF2B5EF4-FFF2-40B4-BE49-F238E27FC236}">
+                <a16:creationId xmlns:a16="http://schemas.microsoft.com/office/drawing/2014/main" id="{82DD5623-3444-453D-99EE-6952B90F92D3}"/>
+              </a:ext>
+            </a:extLst>
+          </p:cNvPr>
+          <p:cNvSpPr txBox="1"/>
+          <p:nvPr/>
+        </p:nvSpPr>
+        <p:spPr>
+          <a:xfrm>
+            <a:off x="10049882" y="6296939"/>
+            <a:ext cx="1386918" cy="369332"/>
+          </a:xfrm>
+          <a:prstGeom prst="rect">
+            <a:avLst/>
+          </a:prstGeom>
+          <a:noFill/>
+        </p:spPr>
+        <p:txBody>
+          <a:bodyPr wrap="none" rtlCol="0">
+            <a:spAutoFit/>
+          </a:bodyPr>
+          <a:lstStyle/>
+          <a:p>
+            <a:r>
+              <a:rPr lang="pt-PT" dirty="0"/>
+              <a:t>25/04/2018</a:t>
+            </a:r>
+          </a:p>
+        </p:txBody>
+      </p:sp>
+      <p:sp>
+        <p:nvSpPr>
+          <p:cNvPr id="9" name="Retângulo 8">
+            <a:extLst>
+              <a:ext uri="{FF2B5EF4-FFF2-40B4-BE49-F238E27FC236}">
+                <a16:creationId xmlns:a16="http://schemas.microsoft.com/office/drawing/2014/main" id="{79A896E0-63A0-4759-AF35-97051F673360}"/>
+              </a:ext>
+            </a:extLst>
+          </p:cNvPr>
+          <p:cNvSpPr/>
+          <p:nvPr/>
+        </p:nvSpPr>
+        <p:spPr>
+          <a:xfrm>
+            <a:off x="2239736" y="379204"/>
+            <a:ext cx="6425293" cy="461665"/>
+          </a:xfrm>
+          <a:prstGeom prst="rect">
+            <a:avLst/>
+          </a:prstGeom>
+        </p:spPr>
+        <p:txBody>
+          <a:bodyPr wrap="square">
+            <a:spAutoFit/>
+          </a:bodyPr>
+          <a:lstStyle/>
+          <a:p>
+            <a:r>
+              <a:rPr lang="pt-PT" sz="1200" dirty="0">
+                <a:cs typeface="Arial" panose="020B0604020202020204" pitchFamily="34" charset="0"/>
+              </a:rPr>
+              <a:t>Área Departamental de Engenharia de Eletrónica e Telecomunicações e de Computadores Licenciatura em Engenharia Informática e de Computadores </a:t>
+            </a:r>
+          </a:p>
+        </p:txBody>
+      </p:sp>
     </p:spTree>
     <p:extLst>
       <p:ext uri="{BB962C8B-B14F-4D97-AF65-F5344CB8AC3E}">
@@ -3520,34 +3607,6 @@
       </p:grpSpPr>
       <p:sp>
         <p:nvSpPr>
-          <p:cNvPr id="2" name="Título 1">
-            <a:extLst>
-              <a:ext uri="{FF2B5EF4-FFF2-40B4-BE49-F238E27FC236}">
-                <a16:creationId xmlns:a16="http://schemas.microsoft.com/office/drawing/2014/main" id="{78321EE3-F920-4080-B8B0-B650BC2FF3F8}"/>
-              </a:ext>
-            </a:extLst>
-          </p:cNvPr>
-          <p:cNvSpPr>
-            <a:spLocks noGrp="1"/>
-          </p:cNvSpPr>
-          <p:nvPr>
-            <p:ph type="title"/>
-          </p:nvPr>
-        </p:nvSpPr>
-        <p:spPr/>
-        <p:txBody>
-          <a:bodyPr/>
-          <a:lstStyle/>
-          <a:p>
-            <a:r>
-              <a:rPr lang="pt-PT" dirty="0"/>
-              <a:t>O que é a informação?</a:t>
-            </a:r>
-          </a:p>
-        </p:txBody>
-      </p:sp>
-      <p:sp>
-        <p:nvSpPr>
           <p:cNvPr id="6" name="Título 1">
             <a:extLst>
               <a:ext uri="{FF2B5EF4-FFF2-40B4-BE49-F238E27FC236}">
@@ -3562,8 +3621,8 @@
         </p:nvSpPr>
         <p:spPr>
           <a:xfrm>
-            <a:off x="838200" y="3429000"/>
-            <a:ext cx="10515600" cy="1325563"/>
+            <a:off x="838200" y="3426823"/>
+            <a:ext cx="7060474" cy="1325563"/>
           </a:xfrm>
           <a:prstGeom prst="rect">
             <a:avLst/>
@@ -3594,8 +3653,48 @@
           </a:lstStyle>
           <a:p>
             <a:r>
-              <a:rPr lang="pt-PT" dirty="0"/>
+              <a:rPr lang="pt-PT" dirty="0">
+                <a:latin typeface="+mn-lt"/>
+                <a:cs typeface="Arial" panose="020B0604020202020204" pitchFamily="34" charset="0"/>
+              </a:rPr>
               <a:t>Onde existe a informação?</a:t>
+            </a:r>
+          </a:p>
+        </p:txBody>
+      </p:sp>
+      <p:sp>
+        <p:nvSpPr>
+          <p:cNvPr id="3" name="CaixaDeTexto 2">
+            <a:extLst>
+              <a:ext uri="{FF2B5EF4-FFF2-40B4-BE49-F238E27FC236}">
+                <a16:creationId xmlns:a16="http://schemas.microsoft.com/office/drawing/2014/main" id="{0AFD9C56-6B18-4284-AE9B-C6B581540511}"/>
+              </a:ext>
+            </a:extLst>
+          </p:cNvPr>
+          <p:cNvSpPr txBox="1"/>
+          <p:nvPr/>
+        </p:nvSpPr>
+        <p:spPr>
+          <a:xfrm>
+            <a:off x="838200" y="757645"/>
+            <a:ext cx="6008440" cy="769441"/>
+          </a:xfrm>
+          <a:prstGeom prst="rect">
+            <a:avLst/>
+          </a:prstGeom>
+          <a:noFill/>
+        </p:spPr>
+        <p:txBody>
+          <a:bodyPr wrap="none" rtlCol="0">
+            <a:spAutoFit/>
+          </a:bodyPr>
+          <a:lstStyle/>
+          <a:p>
+            <a:r>
+              <a:rPr lang="pt-PT" sz="4400" dirty="0">
+                <a:cs typeface="Arial" panose="020B0604020202020204" pitchFamily="34" charset="0"/>
+              </a:rPr>
+              <a:t>O que é a informação?</a:t>
             </a:r>
           </a:p>
         </p:txBody>
@@ -3764,67 +3863,116 @@
       </p:grpSpPr>
       <p:sp>
         <p:nvSpPr>
-          <p:cNvPr id="2" name="Título 1">
+          <p:cNvPr id="5" name="CaixaDeTexto 4">
             <a:extLst>
               <a:ext uri="{FF2B5EF4-FFF2-40B4-BE49-F238E27FC236}">
-                <a16:creationId xmlns:a16="http://schemas.microsoft.com/office/drawing/2014/main" id="{1C7C1696-EC3A-4758-A8B2-41F2BD0F534B}"/>
+                <a16:creationId xmlns:a16="http://schemas.microsoft.com/office/drawing/2014/main" id="{161A3863-D7DF-4F2B-902C-AC8F4000A3AB}"/>
               </a:ext>
             </a:extLst>
           </p:cNvPr>
-          <p:cNvSpPr>
-            <a:spLocks noGrp="1"/>
-          </p:cNvSpPr>
-          <p:nvPr>
-            <p:ph type="ctrTitle"/>
-          </p:nvPr>
+          <p:cNvSpPr txBox="1"/>
+          <p:nvPr/>
         </p:nvSpPr>
         <p:spPr>
           <a:xfrm>
-            <a:off x="1415143" y="504314"/>
-            <a:ext cx="9361714" cy="957682"/>
-          </a:xfrm>
-        </p:spPr>
-        <p:txBody>
-          <a:bodyPr/>
-          <a:lstStyle/>
-          <a:p>
-            <a:r>
-              <a:rPr lang="pt-PT" dirty="0"/>
-              <a:t>Propriedades</a:t>
-            </a:r>
-          </a:p>
-        </p:txBody>
-      </p:sp>
-      <p:pic>
-        <p:nvPicPr>
-          <p:cNvPr id="4" name="Imagem 3">
-            <a:extLst>
-              <a:ext uri="{FF2B5EF4-FFF2-40B4-BE49-F238E27FC236}">
-                <a16:creationId xmlns:a16="http://schemas.microsoft.com/office/drawing/2014/main" id="{E069D464-C5F1-469B-882B-FC6E6D9D2AC5}"/>
-              </a:ext>
-            </a:extLst>
-          </p:cNvPr>
-          <p:cNvPicPr>
-            <a:picLocks noChangeAspect="1"/>
-          </p:cNvPicPr>
-          <p:nvPr/>
-        </p:nvPicPr>
-        <p:blipFill>
-          <a:blip r:embed="rId2"/>
-          <a:stretch>
-            <a:fillRect/>
-          </a:stretch>
-        </p:blipFill>
-        <p:spPr>
-          <a:xfrm>
-            <a:off x="3298644" y="1461996"/>
-            <a:ext cx="5594712" cy="5056758"/>
+            <a:off x="3834515" y="506202"/>
+            <a:ext cx="4522969" cy="923330"/>
           </a:xfrm>
           <a:prstGeom prst="rect">
             <a:avLst/>
           </a:prstGeom>
+          <a:noFill/>
         </p:spPr>
-      </p:pic>
+        <p:txBody>
+          <a:bodyPr wrap="none" rtlCol="0">
+            <a:spAutoFit/>
+          </a:bodyPr>
+          <a:lstStyle/>
+          <a:p>
+            <a:r>
+              <a:rPr lang="pt-PT" sz="5400" dirty="0"/>
+              <a:t>Propriedades</a:t>
+            </a:r>
+          </a:p>
+        </p:txBody>
+      </p:sp>
+      <p:sp>
+        <p:nvSpPr>
+          <p:cNvPr id="7" name="CaixaDeTexto 6">
+            <a:extLst>
+              <a:ext uri="{FF2B5EF4-FFF2-40B4-BE49-F238E27FC236}">
+                <a16:creationId xmlns:a16="http://schemas.microsoft.com/office/drawing/2014/main" id="{42BC6D7A-B81F-4E65-ADE6-DB5318AEC1B8}"/>
+              </a:ext>
+            </a:extLst>
+          </p:cNvPr>
+          <p:cNvSpPr txBox="1"/>
+          <p:nvPr/>
+        </p:nvSpPr>
+        <p:spPr>
+          <a:xfrm>
+            <a:off x="687977" y="2081349"/>
+            <a:ext cx="5233852" cy="2616101"/>
+          </a:xfrm>
+          <a:prstGeom prst="rect">
+            <a:avLst/>
+          </a:prstGeom>
+          <a:noFill/>
+        </p:spPr>
+        <p:txBody>
+          <a:bodyPr wrap="square" rtlCol="0">
+            <a:spAutoFit/>
+          </a:bodyPr>
+          <a:lstStyle/>
+          <a:p>
+            <a:pPr marL="285750" indent="-285750">
+              <a:spcBef>
+                <a:spcPts val="2400"/>
+              </a:spcBef>
+              <a:spcAft>
+                <a:spcPts val="2400"/>
+              </a:spcAft>
+              <a:buFont typeface="Arial" panose="020B0604020202020204" pitchFamily="34" charset="0"/>
+              <a:buChar char="•"/>
+            </a:pPr>
+            <a:r>
+              <a:rPr lang="pt-PT" sz="2800" dirty="0"/>
+              <a:t>Confidencialidade</a:t>
+            </a:r>
+          </a:p>
+          <a:p>
+            <a:pPr marL="285750" indent="-285750">
+              <a:spcBef>
+                <a:spcPts val="2400"/>
+              </a:spcBef>
+              <a:spcAft>
+                <a:spcPts val="2400"/>
+              </a:spcAft>
+              <a:buFont typeface="Arial" panose="020B0604020202020204" pitchFamily="34" charset="0"/>
+              <a:buChar char="•"/>
+            </a:pPr>
+            <a:r>
+              <a:rPr lang="pt-PT" sz="2800" dirty="0"/>
+              <a:t>Integridade</a:t>
+            </a:r>
+          </a:p>
+          <a:p>
+            <a:pPr marL="285750" indent="-285750">
+              <a:spcBef>
+                <a:spcPts val="2400"/>
+              </a:spcBef>
+              <a:spcAft>
+                <a:spcPts val="2400"/>
+              </a:spcAft>
+              <a:buFont typeface="Arial" panose="020B0604020202020204" pitchFamily="34" charset="0"/>
+              <a:buChar char="•"/>
+            </a:pPr>
+            <a:r>
+              <a:rPr lang="pt-PT" sz="2800" dirty="0"/>
+              <a:t>Disponibilidade</a:t>
+            </a:r>
+          </a:p>
+        </p:txBody>
+      </p:sp>
     </p:spTree>
     <p:extLst>
       <p:ext uri="{BB962C8B-B14F-4D97-AF65-F5344CB8AC3E}">
@@ -3835,6 +3983,381 @@
   <p:clrMapOvr>
     <a:masterClrMapping/>
   </p:clrMapOvr>
+  <p:timing>
+    <p:tnLst>
+      <p:par>
+        <p:cTn id="1" dur="indefinite" restart="never" nodeType="tmRoot">
+          <p:childTnLst>
+            <p:seq concurrent="1" nextAc="seek">
+              <p:cTn id="2" dur="indefinite" nodeType="mainSeq">
+                <p:childTnLst>
+                  <p:par>
+                    <p:cTn id="3" fill="hold">
+                      <p:stCondLst>
+                        <p:cond delay="indefinite"/>
+                      </p:stCondLst>
+                      <p:childTnLst>
+                        <p:par>
+                          <p:cTn id="4" fill="hold">
+                            <p:stCondLst>
+                              <p:cond delay="0"/>
+                            </p:stCondLst>
+                            <p:childTnLst>
+                              <p:par>
+                                <p:cTn id="5" presetID="42" presetClass="entr" presetSubtype="0" fill="hold" nodeType="clickEffect">
+                                  <p:stCondLst>
+                                    <p:cond delay="0"/>
+                                  </p:stCondLst>
+                                  <p:childTnLst>
+                                    <p:set>
+                                      <p:cBhvr>
+                                        <p:cTn id="6" dur="1" fill="hold">
+                                          <p:stCondLst>
+                                            <p:cond delay="0"/>
+                                          </p:stCondLst>
+                                        </p:cTn>
+                                        <p:tgtEl>
+                                          <p:spTgt spid="7">
+                                            <p:txEl>
+                                              <p:pRg st="0" end="0"/>
+                                            </p:txEl>
+                                          </p:spTgt>
+                                        </p:tgtEl>
+                                        <p:attrNameLst>
+                                          <p:attrName>style.visibility</p:attrName>
+                                        </p:attrNameLst>
+                                      </p:cBhvr>
+                                      <p:to>
+                                        <p:strVal val="visible"/>
+                                      </p:to>
+                                    </p:set>
+                                    <p:animEffect transition="in" filter="fade">
+                                      <p:cBhvr>
+                                        <p:cTn id="7" dur="1000"/>
+                                        <p:tgtEl>
+                                          <p:spTgt spid="7">
+                                            <p:txEl>
+                                              <p:pRg st="0" end="0"/>
+                                            </p:txEl>
+                                          </p:spTgt>
+                                        </p:tgtEl>
+                                      </p:cBhvr>
+                                    </p:animEffect>
+                                    <p:anim calcmode="lin" valueType="num">
+                                      <p:cBhvr>
+                                        <p:cTn id="8" dur="1000" fill="hold"/>
+                                        <p:tgtEl>
+                                          <p:spTgt spid="7">
+                                            <p:txEl>
+                                              <p:pRg st="0" end="0"/>
+                                            </p:txEl>
+                                          </p:spTgt>
+                                        </p:tgtEl>
+                                        <p:attrNameLst>
+                                          <p:attrName>ppt_x</p:attrName>
+                                        </p:attrNameLst>
+                                      </p:cBhvr>
+                                      <p:tavLst>
+                                        <p:tav tm="0">
+                                          <p:val>
+                                            <p:strVal val="#ppt_x"/>
+                                          </p:val>
+                                        </p:tav>
+                                        <p:tav tm="100000">
+                                          <p:val>
+                                            <p:strVal val="#ppt_x"/>
+                                          </p:val>
+                                        </p:tav>
+                                      </p:tavLst>
+                                    </p:anim>
+                                    <p:anim calcmode="lin" valueType="num">
+                                      <p:cBhvr>
+                                        <p:cTn id="9" dur="1000" fill="hold"/>
+                                        <p:tgtEl>
+                                          <p:spTgt spid="7">
+                                            <p:txEl>
+                                              <p:pRg st="0" end="0"/>
+                                            </p:txEl>
+                                          </p:spTgt>
+                                        </p:tgtEl>
+                                        <p:attrNameLst>
+                                          <p:attrName>ppt_y</p:attrName>
+                                        </p:attrNameLst>
+                                      </p:cBhvr>
+                                      <p:tavLst>
+                                        <p:tav tm="0">
+                                          <p:val>
+                                            <p:strVal val="#ppt_y+.1"/>
+                                          </p:val>
+                                        </p:tav>
+                                        <p:tav tm="100000">
+                                          <p:val>
+                                            <p:strVal val="#ppt_y"/>
+                                          </p:val>
+                                        </p:tav>
+                                      </p:tavLst>
+                                    </p:anim>
+                                  </p:childTnLst>
+                                </p:cTn>
+                              </p:par>
+                            </p:childTnLst>
+                          </p:cTn>
+                        </p:par>
+                      </p:childTnLst>
+                    </p:cTn>
+                  </p:par>
+                  <p:par>
+                    <p:cTn id="10" fill="hold">
+                      <p:stCondLst>
+                        <p:cond delay="indefinite"/>
+                      </p:stCondLst>
+                      <p:childTnLst>
+                        <p:par>
+                          <p:cTn id="11" fill="hold">
+                            <p:stCondLst>
+                              <p:cond delay="0"/>
+                            </p:stCondLst>
+                            <p:childTnLst>
+                              <p:par>
+                                <p:cTn id="12" presetID="42" presetClass="entr" presetSubtype="0" fill="hold" nodeType="clickEffect">
+                                  <p:stCondLst>
+                                    <p:cond delay="0"/>
+                                  </p:stCondLst>
+                                  <p:childTnLst>
+                                    <p:set>
+                                      <p:cBhvr>
+                                        <p:cTn id="13" dur="1" fill="hold">
+                                          <p:stCondLst>
+                                            <p:cond delay="0"/>
+                                          </p:stCondLst>
+                                        </p:cTn>
+                                        <p:tgtEl>
+                                          <p:spTgt spid="7">
+                                            <p:txEl>
+                                              <p:pRg st="1" end="1"/>
+                                            </p:txEl>
+                                          </p:spTgt>
+                                        </p:tgtEl>
+                                        <p:attrNameLst>
+                                          <p:attrName>style.visibility</p:attrName>
+                                        </p:attrNameLst>
+                                      </p:cBhvr>
+                                      <p:to>
+                                        <p:strVal val="visible"/>
+                                      </p:to>
+                                    </p:set>
+                                    <p:animEffect transition="in" filter="fade">
+                                      <p:cBhvr>
+                                        <p:cTn id="14" dur="1000"/>
+                                        <p:tgtEl>
+                                          <p:spTgt spid="7">
+                                            <p:txEl>
+                                              <p:pRg st="1" end="1"/>
+                                            </p:txEl>
+                                          </p:spTgt>
+                                        </p:tgtEl>
+                                      </p:cBhvr>
+                                    </p:animEffect>
+                                    <p:anim calcmode="lin" valueType="num">
+                                      <p:cBhvr>
+                                        <p:cTn id="15" dur="1000" fill="hold"/>
+                                        <p:tgtEl>
+                                          <p:spTgt spid="7">
+                                            <p:txEl>
+                                              <p:pRg st="1" end="1"/>
+                                            </p:txEl>
+                                          </p:spTgt>
+                                        </p:tgtEl>
+                                        <p:attrNameLst>
+                                          <p:attrName>ppt_x</p:attrName>
+                                        </p:attrNameLst>
+                                      </p:cBhvr>
+                                      <p:tavLst>
+                                        <p:tav tm="0">
+                                          <p:val>
+                                            <p:strVal val="#ppt_x"/>
+                                          </p:val>
+                                        </p:tav>
+                                        <p:tav tm="100000">
+                                          <p:val>
+                                            <p:strVal val="#ppt_x"/>
+                                          </p:val>
+                                        </p:tav>
+                                      </p:tavLst>
+                                    </p:anim>
+                                    <p:anim calcmode="lin" valueType="num">
+                                      <p:cBhvr>
+                                        <p:cTn id="16" dur="1000" fill="hold"/>
+                                        <p:tgtEl>
+                                          <p:spTgt spid="7">
+                                            <p:txEl>
+                                              <p:pRg st="1" end="1"/>
+                                            </p:txEl>
+                                          </p:spTgt>
+                                        </p:tgtEl>
+                                        <p:attrNameLst>
+                                          <p:attrName>ppt_y</p:attrName>
+                                        </p:attrNameLst>
+                                      </p:cBhvr>
+                                      <p:tavLst>
+                                        <p:tav tm="0">
+                                          <p:val>
+                                            <p:strVal val="#ppt_y+.1"/>
+                                          </p:val>
+                                        </p:tav>
+                                        <p:tav tm="100000">
+                                          <p:val>
+                                            <p:strVal val="#ppt_y"/>
+                                          </p:val>
+                                        </p:tav>
+                                      </p:tavLst>
+                                    </p:anim>
+                                  </p:childTnLst>
+                                </p:cTn>
+                              </p:par>
+                            </p:childTnLst>
+                          </p:cTn>
+                        </p:par>
+                      </p:childTnLst>
+                    </p:cTn>
+                  </p:par>
+                  <p:par>
+                    <p:cTn id="17" fill="hold">
+                      <p:stCondLst>
+                        <p:cond delay="indefinite"/>
+                      </p:stCondLst>
+                      <p:childTnLst>
+                        <p:par>
+                          <p:cTn id="18" fill="hold">
+                            <p:stCondLst>
+                              <p:cond delay="0"/>
+                            </p:stCondLst>
+                            <p:childTnLst>
+                              <p:par>
+                                <p:cTn id="19" presetID="42" presetClass="entr" presetSubtype="0" fill="hold" nodeType="clickEffect">
+                                  <p:stCondLst>
+                                    <p:cond delay="0"/>
+                                  </p:stCondLst>
+                                  <p:childTnLst>
+                                    <p:set>
+                                      <p:cBhvr>
+                                        <p:cTn id="20" dur="1" fill="hold">
+                                          <p:stCondLst>
+                                            <p:cond delay="0"/>
+                                          </p:stCondLst>
+                                        </p:cTn>
+                                        <p:tgtEl>
+                                          <p:spTgt spid="7">
+                                            <p:txEl>
+                                              <p:pRg st="2" end="2"/>
+                                            </p:txEl>
+                                          </p:spTgt>
+                                        </p:tgtEl>
+                                        <p:attrNameLst>
+                                          <p:attrName>style.visibility</p:attrName>
+                                        </p:attrNameLst>
+                                      </p:cBhvr>
+                                      <p:to>
+                                        <p:strVal val="visible"/>
+                                      </p:to>
+                                    </p:set>
+                                    <p:animEffect transition="in" filter="fade">
+                                      <p:cBhvr>
+                                        <p:cTn id="21" dur="1000"/>
+                                        <p:tgtEl>
+                                          <p:spTgt spid="7">
+                                            <p:txEl>
+                                              <p:pRg st="2" end="2"/>
+                                            </p:txEl>
+                                          </p:spTgt>
+                                        </p:tgtEl>
+                                      </p:cBhvr>
+                                    </p:animEffect>
+                                    <p:anim calcmode="lin" valueType="num">
+                                      <p:cBhvr>
+                                        <p:cTn id="22" dur="1000" fill="hold"/>
+                                        <p:tgtEl>
+                                          <p:spTgt spid="7">
+                                            <p:txEl>
+                                              <p:pRg st="2" end="2"/>
+                                            </p:txEl>
+                                          </p:spTgt>
+                                        </p:tgtEl>
+                                        <p:attrNameLst>
+                                          <p:attrName>ppt_x</p:attrName>
+                                        </p:attrNameLst>
+                                      </p:cBhvr>
+                                      <p:tavLst>
+                                        <p:tav tm="0">
+                                          <p:val>
+                                            <p:strVal val="#ppt_x"/>
+                                          </p:val>
+                                        </p:tav>
+                                        <p:tav tm="100000">
+                                          <p:val>
+                                            <p:strVal val="#ppt_x"/>
+                                          </p:val>
+                                        </p:tav>
+                                      </p:tavLst>
+                                    </p:anim>
+                                    <p:anim calcmode="lin" valueType="num">
+                                      <p:cBhvr>
+                                        <p:cTn id="23" dur="1000" fill="hold"/>
+                                        <p:tgtEl>
+                                          <p:spTgt spid="7">
+                                            <p:txEl>
+                                              <p:pRg st="2" end="2"/>
+                                            </p:txEl>
+                                          </p:spTgt>
+                                        </p:tgtEl>
+                                        <p:attrNameLst>
+                                          <p:attrName>ppt_y</p:attrName>
+                                        </p:attrNameLst>
+                                      </p:cBhvr>
+                                      <p:tavLst>
+                                        <p:tav tm="0">
+                                          <p:val>
+                                            <p:strVal val="#ppt_y+.1"/>
+                                          </p:val>
+                                        </p:tav>
+                                        <p:tav tm="100000">
+                                          <p:val>
+                                            <p:strVal val="#ppt_y"/>
+                                          </p:val>
+                                        </p:tav>
+                                      </p:tavLst>
+                                    </p:anim>
+                                  </p:childTnLst>
+                                </p:cTn>
+                              </p:par>
+                            </p:childTnLst>
+                          </p:cTn>
+                        </p:par>
+                      </p:childTnLst>
+                    </p:cTn>
+                  </p:par>
+                </p:childTnLst>
+              </p:cTn>
+              <p:prevCondLst>
+                <p:cond evt="onPrev" delay="0">
+                  <p:tgtEl>
+                    <p:sldTgt/>
+                  </p:tgtEl>
+                </p:cond>
+              </p:prevCondLst>
+              <p:nextCondLst>
+                <p:cond evt="onNext" delay="0">
+                  <p:tgtEl>
+                    <p:sldTgt/>
+                  </p:tgtEl>
+                </p:cond>
+              </p:nextCondLst>
+            </p:seq>
+          </p:childTnLst>
+        </p:cTn>
+      </p:par>
+    </p:tnLst>
+  </p:timing>
 </p:sld>
 </file>
 
@@ -3855,41 +4378,6 @@
           <a:chExt cx="0" cy="0"/>
         </a:xfrm>
       </p:grpSpPr>
-      <p:sp>
-        <p:nvSpPr>
-          <p:cNvPr id="2" name="Título 1">
-            <a:extLst>
-              <a:ext uri="{FF2B5EF4-FFF2-40B4-BE49-F238E27FC236}">
-                <a16:creationId xmlns:a16="http://schemas.microsoft.com/office/drawing/2014/main" id="{BC883564-594C-420B-9230-41D1C6A8F27E}"/>
-              </a:ext>
-            </a:extLst>
-          </p:cNvPr>
-          <p:cNvSpPr>
-            <a:spLocks noGrp="1"/>
-          </p:cNvSpPr>
-          <p:nvPr>
-            <p:ph type="ctrTitle"/>
-          </p:nvPr>
-        </p:nvSpPr>
-        <p:spPr>
-          <a:xfrm>
-            <a:off x="1554480" y="512763"/>
-            <a:ext cx="9083040" cy="1446666"/>
-          </a:xfrm>
-        </p:spPr>
-        <p:txBody>
-          <a:bodyPr>
-            <a:normAutofit fontScale="90000"/>
-          </a:bodyPr>
-          <a:lstStyle/>
-          <a:p>
-            <a:r>
-              <a:rPr lang="pt-PT" dirty="0"/>
-              <a:t>Existe 100% de segurança da informação?</a:t>
-            </a:r>
-          </a:p>
-        </p:txBody>
-      </p:sp>
       <p:pic>
         <p:nvPicPr>
           <p:cNvPr id="1026" name="Picture 2" descr="https://investidor.pt/imagens/balan%C3%A7a.jpg">
@@ -3919,8 +4407,8 @@
         </p:blipFill>
         <p:spPr bwMode="auto">
           <a:xfrm>
-            <a:off x="2557054" y="1959429"/>
-            <a:ext cx="7077891" cy="4718594"/>
+            <a:off x="3926749" y="2541937"/>
+            <a:ext cx="4338501" cy="2892334"/>
           </a:xfrm>
           <a:prstGeom prst="rect">
             <a:avLst/>
@@ -3937,6 +4425,49 @@
           </a:extLst>
         </p:spPr>
       </p:pic>
+      <p:sp>
+        <p:nvSpPr>
+          <p:cNvPr id="3" name="CaixaDeTexto 2">
+            <a:extLst>
+              <a:ext uri="{FF2B5EF4-FFF2-40B4-BE49-F238E27FC236}">
+                <a16:creationId xmlns:a16="http://schemas.microsoft.com/office/drawing/2014/main" id="{2C3A3EFF-BDEC-4FED-8D28-97338A0FE072}"/>
+              </a:ext>
+            </a:extLst>
+          </p:cNvPr>
+          <p:cNvSpPr txBox="1"/>
+          <p:nvPr/>
+        </p:nvSpPr>
+        <p:spPr>
+          <a:xfrm>
+            <a:off x="2286207" y="417622"/>
+            <a:ext cx="7619586" cy="1569660"/>
+          </a:xfrm>
+          <a:prstGeom prst="rect">
+            <a:avLst/>
+          </a:prstGeom>
+          <a:noFill/>
+        </p:spPr>
+        <p:txBody>
+          <a:bodyPr wrap="none" rtlCol="0">
+            <a:spAutoFit/>
+          </a:bodyPr>
+          <a:lstStyle/>
+          <a:p>
+            <a:pPr algn="ctr"/>
+            <a:r>
+              <a:rPr lang="pt-PT" sz="4800" dirty="0"/>
+              <a:t>Existe 100% de </a:t>
+            </a:r>
+          </a:p>
+          <a:p>
+            <a:pPr algn="ctr"/>
+            <a:r>
+              <a:rPr lang="pt-PT" sz="4800" dirty="0"/>
+              <a:t>segurança da informação?</a:t>
+            </a:r>
+          </a:p>
+        </p:txBody>
+      </p:sp>
     </p:spTree>
     <p:extLst>
       <p:ext uri="{BB962C8B-B14F-4D97-AF65-F5344CB8AC3E}">
@@ -3950,10 +4481,289 @@
 </p:sld>
 </file>
 
+<file path=ppt/slides/slide5.xml><?xml version="1.0" encoding="utf-8"?>
+<p:sld xmlns:a="http://schemas.openxmlformats.org/drawingml/2006/main" xmlns:r="http://schemas.openxmlformats.org/officeDocument/2006/relationships" xmlns:p="http://schemas.openxmlformats.org/presentationml/2006/main">
+  <p:cSld>
+    <p:spTree>
+      <p:nvGrpSpPr>
+        <p:cNvPr id="1" name=""/>
+        <p:cNvGrpSpPr/>
+        <p:nvPr/>
+      </p:nvGrpSpPr>
+      <p:grpSpPr>
+        <a:xfrm>
+          <a:off x="0" y="0"/>
+          <a:ext cx="0" cy="0"/>
+          <a:chOff x="0" y="0"/>
+          <a:chExt cx="0" cy="0"/>
+        </a:xfrm>
+      </p:grpSpPr>
+      <p:pic>
+        <p:nvPicPr>
+          <p:cNvPr id="6" name="Imagem 5">
+            <a:extLst>
+              <a:ext uri="{FF2B5EF4-FFF2-40B4-BE49-F238E27FC236}">
+                <a16:creationId xmlns:a16="http://schemas.microsoft.com/office/drawing/2014/main" id="{211CEDDA-59CC-47C0-81BF-4727A83ED407}"/>
+              </a:ext>
+            </a:extLst>
+          </p:cNvPr>
+          <p:cNvPicPr>
+            <a:picLocks noChangeAspect="1"/>
+          </p:cNvPicPr>
+          <p:nvPr/>
+        </p:nvPicPr>
+        <p:blipFill>
+          <a:blip r:embed="rId2">
+            <a:extLst>
+              <a:ext uri="{28A0092B-C50C-407E-A947-70E740481C1C}">
+                <a14:useLocalDpi xmlns:a14="http://schemas.microsoft.com/office/drawing/2010/main" val="0"/>
+              </a:ext>
+            </a:extLst>
+          </a:blip>
+          <a:stretch>
+            <a:fillRect/>
+          </a:stretch>
+        </p:blipFill>
+        <p:spPr>
+          <a:xfrm>
+            <a:off x="4056287" y="1912536"/>
+            <a:ext cx="4079421" cy="4079421"/>
+          </a:xfrm>
+          <a:prstGeom prst="rect">
+            <a:avLst/>
+          </a:prstGeom>
+        </p:spPr>
+      </p:pic>
+      <p:sp>
+        <p:nvSpPr>
+          <p:cNvPr id="7" name="CaixaDeTexto 6">
+            <a:extLst>
+              <a:ext uri="{FF2B5EF4-FFF2-40B4-BE49-F238E27FC236}">
+                <a16:creationId xmlns:a16="http://schemas.microsoft.com/office/drawing/2014/main" id="{D9FA8929-CA9E-4928-9B15-5AAB88A67BF8}"/>
+              </a:ext>
+            </a:extLst>
+          </p:cNvPr>
+          <p:cNvSpPr txBox="1"/>
+          <p:nvPr/>
+        </p:nvSpPr>
+        <p:spPr>
+          <a:xfrm>
+            <a:off x="760980" y="255979"/>
+            <a:ext cx="10670037" cy="1446550"/>
+          </a:xfrm>
+          <a:prstGeom prst="rect">
+            <a:avLst/>
+          </a:prstGeom>
+          <a:noFill/>
+        </p:spPr>
+        <p:txBody>
+          <a:bodyPr wrap="none" rtlCol="0">
+            <a:spAutoFit/>
+          </a:bodyPr>
+          <a:lstStyle/>
+          <a:p>
+            <a:r>
+              <a:rPr lang="pt-PT" sz="4400" dirty="0"/>
+              <a:t>Exemplo 1 – Como garantir a segurança </a:t>
+            </a:r>
+          </a:p>
+          <a:p>
+            <a:r>
+              <a:rPr lang="pt-PT" sz="4400" dirty="0"/>
+              <a:t>nas casas inteligentes?</a:t>
+            </a:r>
+          </a:p>
+        </p:txBody>
+      </p:sp>
+    </p:spTree>
+    <p:extLst>
+      <p:ext uri="{BB962C8B-B14F-4D97-AF65-F5344CB8AC3E}">
+        <p14:creationId xmlns:p14="http://schemas.microsoft.com/office/powerpoint/2010/main" val="3906377170"/>
+      </p:ext>
+    </p:extLst>
+  </p:cSld>
+  <p:clrMapOvr>
+    <a:masterClrMapping/>
+  </p:clrMapOvr>
+</p:sld>
+</file>
+
+<file path=ppt/slides/slide6.xml><?xml version="1.0" encoding="utf-8"?>
+<p:sld xmlns:a="http://schemas.openxmlformats.org/drawingml/2006/main" xmlns:r="http://schemas.openxmlformats.org/officeDocument/2006/relationships" xmlns:p="http://schemas.openxmlformats.org/presentationml/2006/main">
+  <p:cSld>
+    <p:spTree>
+      <p:nvGrpSpPr>
+        <p:cNvPr id="1" name=""/>
+        <p:cNvGrpSpPr/>
+        <p:nvPr/>
+      </p:nvGrpSpPr>
+      <p:grpSpPr>
+        <a:xfrm>
+          <a:off x="0" y="0"/>
+          <a:ext cx="0" cy="0"/>
+          <a:chOff x="0" y="0"/>
+          <a:chExt cx="0" cy="0"/>
+        </a:xfrm>
+      </p:grpSpPr>
+      <p:sp>
+        <p:nvSpPr>
+          <p:cNvPr id="4" name="CaixaDeTexto 3">
+            <a:extLst>
+              <a:ext uri="{FF2B5EF4-FFF2-40B4-BE49-F238E27FC236}">
+                <a16:creationId xmlns:a16="http://schemas.microsoft.com/office/drawing/2014/main" id="{5C758764-93FC-4215-9210-49F27E5136C8}"/>
+              </a:ext>
+            </a:extLst>
+          </p:cNvPr>
+          <p:cNvSpPr txBox="1"/>
+          <p:nvPr/>
+        </p:nvSpPr>
+        <p:spPr>
+          <a:xfrm>
+            <a:off x="760979" y="228545"/>
+            <a:ext cx="10670037" cy="1446550"/>
+          </a:xfrm>
+          <a:prstGeom prst="rect">
+            <a:avLst/>
+          </a:prstGeom>
+          <a:noFill/>
+        </p:spPr>
+        <p:txBody>
+          <a:bodyPr wrap="none" rtlCol="0">
+            <a:spAutoFit/>
+          </a:bodyPr>
+          <a:lstStyle/>
+          <a:p>
+            <a:r>
+              <a:rPr lang="pt-PT" sz="4400" dirty="0"/>
+              <a:t>Exemplo 2 – Como garantir a segurança </a:t>
+            </a:r>
+          </a:p>
+          <a:p>
+            <a:r>
+              <a:rPr lang="pt-PT" sz="4400" dirty="0"/>
+              <a:t>nas cidades inteligentes?</a:t>
+            </a:r>
+          </a:p>
+        </p:txBody>
+      </p:sp>
+      <p:pic>
+        <p:nvPicPr>
+          <p:cNvPr id="7" name="Imagem 6">
+            <a:extLst>
+              <a:ext uri="{FF2B5EF4-FFF2-40B4-BE49-F238E27FC236}">
+                <a16:creationId xmlns:a16="http://schemas.microsoft.com/office/drawing/2014/main" id="{55342B03-95E5-44C5-B997-61DEEEEA3B0F}"/>
+              </a:ext>
+            </a:extLst>
+          </p:cNvPr>
+          <p:cNvPicPr>
+            <a:picLocks noChangeAspect="1"/>
+          </p:cNvPicPr>
+          <p:nvPr/>
+        </p:nvPicPr>
+        <p:blipFill>
+          <a:blip r:embed="rId2">
+            <a:extLst>
+              <a:ext uri="{28A0092B-C50C-407E-A947-70E740481C1C}">
+                <a14:useLocalDpi xmlns:a14="http://schemas.microsoft.com/office/drawing/2010/main" val="0"/>
+              </a:ext>
+            </a:extLst>
+          </a:blip>
+          <a:stretch>
+            <a:fillRect/>
+          </a:stretch>
+        </p:blipFill>
+        <p:spPr>
+          <a:xfrm>
+            <a:off x="2946590" y="1873270"/>
+            <a:ext cx="6298813" cy="4015493"/>
+          </a:xfrm>
+          <a:prstGeom prst="rect">
+            <a:avLst/>
+          </a:prstGeom>
+        </p:spPr>
+      </p:pic>
+    </p:spTree>
+    <p:extLst>
+      <p:ext uri="{BB962C8B-B14F-4D97-AF65-F5344CB8AC3E}">
+        <p14:creationId xmlns:p14="http://schemas.microsoft.com/office/powerpoint/2010/main" val="2373168212"/>
+      </p:ext>
+    </p:extLst>
+  </p:cSld>
+  <p:clrMapOvr>
+    <a:masterClrMapping/>
+  </p:clrMapOvr>
+</p:sld>
+</file>
+
+<file path=ppt/slides/slide7.xml><?xml version="1.0" encoding="utf-8"?>
+<p:sld xmlns:a="http://schemas.openxmlformats.org/drawingml/2006/main" xmlns:r="http://schemas.openxmlformats.org/officeDocument/2006/relationships" xmlns:p="http://schemas.openxmlformats.org/presentationml/2006/main">
+  <p:cSld>
+    <p:spTree>
+      <p:nvGrpSpPr>
+        <p:cNvPr id="1" name=""/>
+        <p:cNvGrpSpPr/>
+        <p:nvPr/>
+      </p:nvGrpSpPr>
+      <p:grpSpPr>
+        <a:xfrm>
+          <a:off x="0" y="0"/>
+          <a:ext cx="0" cy="0"/>
+          <a:chOff x="0" y="0"/>
+          <a:chExt cx="0" cy="0"/>
+        </a:xfrm>
+      </p:grpSpPr>
+      <p:sp>
+        <p:nvSpPr>
+          <p:cNvPr id="4" name="CaixaDeTexto 3">
+            <a:extLst>
+              <a:ext uri="{FF2B5EF4-FFF2-40B4-BE49-F238E27FC236}">
+                <a16:creationId xmlns:a16="http://schemas.microsoft.com/office/drawing/2014/main" id="{558206DC-D027-43D5-94E6-9C73064B455A}"/>
+              </a:ext>
+            </a:extLst>
+          </p:cNvPr>
+          <p:cNvSpPr txBox="1"/>
+          <p:nvPr/>
+        </p:nvSpPr>
+        <p:spPr>
+          <a:xfrm>
+            <a:off x="4152198" y="2967335"/>
+            <a:ext cx="3887603" cy="923330"/>
+          </a:xfrm>
+          <a:prstGeom prst="rect">
+            <a:avLst/>
+          </a:prstGeom>
+          <a:noFill/>
+        </p:spPr>
+        <p:txBody>
+          <a:bodyPr wrap="none" rtlCol="0">
+            <a:spAutoFit/>
+          </a:bodyPr>
+          <a:lstStyle/>
+          <a:p>
+            <a:r>
+              <a:rPr lang="pt-PT" sz="5400" dirty="0"/>
+              <a:t>Conclusões</a:t>
+            </a:r>
+          </a:p>
+        </p:txBody>
+      </p:sp>
+    </p:spTree>
+    <p:extLst>
+      <p:ext uri="{BB962C8B-B14F-4D97-AF65-F5344CB8AC3E}">
+        <p14:creationId xmlns:p14="http://schemas.microsoft.com/office/powerpoint/2010/main" val="2522571712"/>
+      </p:ext>
+    </p:extLst>
+  </p:cSld>
+  <p:clrMapOvr>
+    <a:masterClrMapping/>
+  </p:clrMapOvr>
+</p:sld>
+</file>
+
 <file path=ppt/theme/theme1.xml><?xml version="1.0" encoding="utf-8"?>
-<a:theme xmlns:a="http://schemas.openxmlformats.org/drawingml/2006/main" name="Tema do Office">
+<a:theme xmlns:a="http://schemas.openxmlformats.org/drawingml/2006/main" name="Galeria">
   <a:themeElements>
-    <a:clrScheme name="Office">
+    <a:clrScheme name="Galeria">
       <a:dk1>
         <a:sysClr val="windowText" lastClr="000000"/>
       </a:dk1>
@@ -3961,39 +4771,39 @@
         <a:sysClr val="window" lastClr="FFFFFF"/>
       </a:lt1>
       <a:dk2>
-        <a:srgbClr val="44546A"/>
+        <a:srgbClr val="454545"/>
       </a:dk2>
       <a:lt2>
-        <a:srgbClr val="E7E6E6"/>
+        <a:srgbClr val="DFD9D5"/>
       </a:lt2>
       <a:accent1>
-        <a:srgbClr val="4472C4"/>
+        <a:srgbClr val="FB8C29"/>
       </a:accent1>
       <a:accent2>
-        <a:srgbClr val="ED7D31"/>
+        <a:srgbClr val="F2C351"/>
       </a:accent2>
       <a:accent3>
-        <a:srgbClr val="A5A5A5"/>
+        <a:srgbClr val="D0CBA5"/>
       </a:accent3>
       <a:accent4>
-        <a:srgbClr val="FFC000"/>
+        <a:srgbClr val="A2C476"/>
       </a:accent4>
       <a:accent5>
-        <a:srgbClr val="5B9BD5"/>
+        <a:srgbClr val="57C293"/>
       </a:accent5>
       <a:accent6>
-        <a:srgbClr val="70AD47"/>
+        <a:srgbClr val="06BFDE"/>
       </a:accent6>
       <a:hlink>
-        <a:srgbClr val="0563C1"/>
+        <a:srgbClr val="FBAE29"/>
       </a:hlink>
       <a:folHlink>
-        <a:srgbClr val="954F72"/>
+        <a:srgbClr val="EDC47E"/>
       </a:folHlink>
     </a:clrScheme>
-    <a:fontScheme name="Office">
+    <a:fontScheme name="Galeria">
       <a:majorFont>
-        <a:latin typeface="Calibri Light" panose="020F0302020204030204"/>
+        <a:latin typeface="Rockwell" panose="02060603020205020403"/>
         <a:ea typeface=""/>
         <a:cs typeface=""/>
         <a:font script="Jpan" typeface="游ゴシック Light"/>
@@ -4026,26 +4836,9 @@
         <a:font script="Viet" typeface="Times New Roman"/>
         <a:font script="Uigh" typeface="Microsoft Uighur"/>
         <a:font script="Geor" typeface="Sylfaen"/>
-        <a:font script="Armn" typeface="Arial"/>
-        <a:font script="Bugi" typeface="Leelawadee UI"/>
-        <a:font script="Bopo" typeface="Microsoft JhengHei"/>
-        <a:font script="Java" typeface="Javanese Text"/>
-        <a:font script="Lisu" typeface="Segoe UI"/>
-        <a:font script="Mymr" typeface="Myanmar Text"/>
-        <a:font script="Nkoo" typeface="Ebrima"/>
-        <a:font script="Olck" typeface="Nirmala UI"/>
-        <a:font script="Osma" typeface="Ebrima"/>
-        <a:font script="Phag" typeface="Phagspa"/>
-        <a:font script="Syrn" typeface="Estrangelo Edessa"/>
-        <a:font script="Syrj" typeface="Estrangelo Edessa"/>
-        <a:font script="Syre" typeface="Estrangelo Edessa"/>
-        <a:font script="Sora" typeface="Nirmala UI"/>
-        <a:font script="Tale" typeface="Microsoft Tai Le"/>
-        <a:font script="Talu" typeface="Microsoft New Tai Lue"/>
-        <a:font script="Tfng" typeface="Ebrima"/>
       </a:majorFont>
       <a:minorFont>
-        <a:latin typeface="Calibri" panose="020F0502020204030204"/>
+        <a:latin typeface="Rockwell" panose="02060603020205020403"/>
         <a:ea typeface=""/>
         <a:cs typeface=""/>
         <a:font script="Jpan" typeface="游ゴシック"/>
@@ -4078,26 +4871,9 @@
         <a:font script="Viet" typeface="Arial"/>
         <a:font script="Uigh" typeface="Microsoft Uighur"/>
         <a:font script="Geor" typeface="Sylfaen"/>
-        <a:font script="Armn" typeface="Arial"/>
-        <a:font script="Bugi" typeface="Leelawadee UI"/>
-        <a:font script="Bopo" typeface="Microsoft JhengHei"/>
-        <a:font script="Java" typeface="Javanese Text"/>
-        <a:font script="Lisu" typeface="Segoe UI"/>
-        <a:font script="Mymr" typeface="Myanmar Text"/>
-        <a:font script="Nkoo" typeface="Ebrima"/>
-        <a:font script="Olck" typeface="Nirmala UI"/>
-        <a:font script="Osma" typeface="Ebrima"/>
-        <a:font script="Phag" typeface="Phagspa"/>
-        <a:font script="Syrn" typeface="Estrangelo Edessa"/>
-        <a:font script="Syrj" typeface="Estrangelo Edessa"/>
-        <a:font script="Syre" typeface="Estrangelo Edessa"/>
-        <a:font script="Sora" typeface="Nirmala UI"/>
-        <a:font script="Tale" typeface="Microsoft Tai Le"/>
-        <a:font script="Talu" typeface="Microsoft New Tai Lue"/>
-        <a:font script="Tfng" typeface="Ebrima"/>
       </a:minorFont>
     </a:fontScheme>
-    <a:fmtScheme name="Office">
+    <a:fmtScheme name="Galeria">
       <a:fillStyleLst>
         <a:solidFill>
           <a:schemeClr val="phClr"/>
@@ -4106,23 +4882,18 @@
           <a:gsLst>
             <a:gs pos="0">
               <a:schemeClr val="phClr">
+                <a:tint val="54000"/>
+                <a:alpha val="100000"/>
+                <a:satMod val="105000"/>
                 <a:lumMod val="110000"/>
-                <a:satMod val="105000"/>
-                <a:tint val="67000"/>
-              </a:schemeClr>
-            </a:gs>
-            <a:gs pos="50000">
-              <a:schemeClr val="phClr">
-                <a:lumMod val="105000"/>
-                <a:satMod val="103000"/>
-                <a:tint val="73000"/>
               </a:schemeClr>
             </a:gs>
             <a:gs pos="100000">
               <a:schemeClr val="phClr">
-                <a:lumMod val="105000"/>
+                <a:tint val="78000"/>
+                <a:alpha val="92000"/>
                 <a:satMod val="109000"/>
-                <a:tint val="81000"/>
+                <a:lumMod val="100000"/>
               </a:schemeClr>
             </a:gs>
           </a:gsLst>
@@ -4132,23 +4903,23 @@
           <a:gsLst>
             <a:gs pos="0">
               <a:schemeClr val="phClr">
-                <a:satMod val="103000"/>
-                <a:lumMod val="102000"/>
-                <a:tint val="94000"/>
+                <a:tint val="98000"/>
+                <a:satMod val="110000"/>
+                <a:lumMod val="104000"/>
               </a:schemeClr>
             </a:gs>
-            <a:gs pos="50000">
+            <a:gs pos="69000">
               <a:schemeClr val="phClr">
-                <a:satMod val="110000"/>
-                <a:lumMod val="100000"/>
-                <a:shade val="100000"/>
+                <a:shade val="88000"/>
+                <a:satMod val="130000"/>
+                <a:lumMod val="92000"/>
               </a:schemeClr>
             </a:gs>
             <a:gs pos="100000">
               <a:schemeClr val="phClr">
-                <a:lumMod val="99000"/>
-                <a:satMod val="120000"/>
                 <a:shade val="78000"/>
+                <a:satMod val="130000"/>
+                <a:lumMod val="92000"/>
               </a:schemeClr>
             </a:gs>
           </a:gsLst>
@@ -4156,26 +4927,23 @@
         </a:gradFill>
       </a:fillStyleLst>
       <a:lnStyleLst>
-        <a:ln w="6350" cap="flat" cmpd="sng" algn="ctr">
+        <a:ln w="9525" cap="flat" cmpd="sng" algn="ctr">
           <a:solidFill>
             <a:schemeClr val="phClr"/>
           </a:solidFill>
           <a:prstDash val="solid"/>
-          <a:miter lim="800000"/>
         </a:ln>
-        <a:ln w="12700" cap="flat" cmpd="sng" algn="ctr">
+        <a:ln w="15875" cap="flat" cmpd="sng" algn="ctr">
           <a:solidFill>
             <a:schemeClr val="phClr"/>
           </a:solidFill>
           <a:prstDash val="solid"/>
-          <a:miter lim="800000"/>
         </a:ln>
-        <a:ln w="19050" cap="flat" cmpd="sng" algn="ctr">
+        <a:ln w="22225" cap="flat" cmpd="sng" algn="ctr">
           <a:solidFill>
             <a:schemeClr val="phClr"/>
           </a:solidFill>
           <a:prstDash val="solid"/>
-          <a:miter lim="800000"/>
         </a:ln>
       </a:lnStyleLst>
       <a:effectStyleLst>
@@ -4187,12 +4955,23 @@
         </a:effectStyle>
         <a:effectStyle>
           <a:effectLst>
-            <a:outerShdw blurRad="57150" dist="19050" dir="5400000" algn="ctr" rotWithShape="0">
+            <a:outerShdw blurRad="50800" dist="50800" dir="5400000" sx="96000" sy="96000" rotWithShape="0">
               <a:srgbClr val="000000">
-                <a:alpha val="63000"/>
+                <a:alpha val="48000"/>
               </a:srgbClr>
             </a:outerShdw>
           </a:effectLst>
+          <a:scene3d>
+            <a:camera prst="orthographicFront">
+              <a:rot lat="0" lon="0" rev="0"/>
+            </a:camera>
+            <a:lightRig rig="balanced" dir="t">
+              <a:rot lat="0" lon="0" rev="1080000"/>
+            </a:lightRig>
+          </a:scene3d>
+          <a:sp3d>
+            <a:bevelT w="38100" h="12700" prst="softRound"/>
+          </a:sp3d>
         </a:effectStyle>
       </a:effectStyleLst>
       <a:bgFillStyleLst>
@@ -4200,37 +4979,26 @@
           <a:schemeClr val="phClr"/>
         </a:solidFill>
         <a:solidFill>
-          <a:schemeClr val="phClr">
-            <a:tint val="95000"/>
-            <a:satMod val="170000"/>
-          </a:schemeClr>
+          <a:schemeClr val="phClr"/>
         </a:solidFill>
         <a:gradFill rotWithShape="1">
           <a:gsLst>
             <a:gs pos="0">
               <a:schemeClr val="phClr">
-                <a:tint val="93000"/>
-                <a:satMod val="150000"/>
-                <a:shade val="98000"/>
-                <a:lumMod val="102000"/>
-              </a:schemeClr>
-            </a:gs>
-            <a:gs pos="50000">
-              <a:schemeClr val="phClr">
-                <a:tint val="98000"/>
-                <a:satMod val="130000"/>
-                <a:shade val="90000"/>
-                <a:lumMod val="103000"/>
+                <a:tint val="94000"/>
+                <a:satMod val="80000"/>
+                <a:lumMod val="106000"/>
               </a:schemeClr>
             </a:gs>
             <a:gs pos="100000">
               <a:schemeClr val="phClr">
-                <a:shade val="63000"/>
-                <a:satMod val="120000"/>
+                <a:shade val="80000"/>
               </a:schemeClr>
             </a:gs>
           </a:gsLst>
-          <a:lin ang="5400000" scaled="0"/>
+          <a:path path="circle">
+            <a:fillToRect l="43000" r="43000" b="100000"/>
+          </a:path>
         </a:gradFill>
       </a:bgFillStyleLst>
     </a:fmtScheme>
@@ -4239,7 +5007,7 @@
   <a:extraClrSchemeLst/>
   <a:extLst>
     <a:ext uri="{05A4C25C-085E-4340-85A3-A5531E510DB2}">
-      <thm15:themeFamily xmlns:thm15="http://schemas.microsoft.com/office/thememl/2012/main" name="Office Theme" id="{62F939B6-93AF-4DB8-9C6B-D6C7DFDC589F}" vid="{4A3C46E8-61CC-4603-A589-7422A47A8E4A}"/>
+      <thm15:themeFamily xmlns:thm15="http://schemas.microsoft.com/office/thememl/2012/main" name="Gallery" id="{BBFCD31E-59A1-489D-B089-A3EAD7CAE12E}" vid="{BB5F5D82-B5E9-469E-A815-C655ED4AF243}"/>
     </a:ext>
   </a:extLst>
 </a:theme>

</xml_diff>